<commit_message>
edited presentation and added picture of robot used in worldskills
</commit_message>
<xml_diff>
--- a/MajorProject/majorProjectPresentation.pptx
+++ b/MajorProject/majorProjectPresentation.pptx
@@ -5,7 +5,7 @@
     <p:sldMasterId id="2147483729" r:id="rId1"/>
   </p:sldMasterIdLst>
   <p:notesMasterIdLst>
-    <p:notesMasterId r:id="rId12"/>
+    <p:notesMasterId r:id="rId13"/>
   </p:notesMasterIdLst>
   <p:sldIdLst>
     <p:sldId id="256" r:id="rId2"/>
@@ -14,10 +14,11 @@
     <p:sldId id="259" r:id="rId5"/>
     <p:sldId id="260" r:id="rId6"/>
     <p:sldId id="261" r:id="rId7"/>
-    <p:sldId id="262" r:id="rId8"/>
-    <p:sldId id="264" r:id="rId9"/>
-    <p:sldId id="263" r:id="rId10"/>
-    <p:sldId id="265" r:id="rId11"/>
+    <p:sldId id="266" r:id="rId8"/>
+    <p:sldId id="262" r:id="rId9"/>
+    <p:sldId id="264" r:id="rId10"/>
+    <p:sldId id="263" r:id="rId11"/>
+    <p:sldId id="265" r:id="rId12"/>
   </p:sldIdLst>
   <p:sldSz cx="12192000" cy="6858000"/>
   <p:notesSz cx="6858000" cy="9144000"/>
@@ -206,7 +207,7 @@
           <a:p>
             <a:fld id="{CB0AD6B3-828B-4AFC-9613-1D7B2A099712}" type="datetimeFigureOut">
               <a:rPr lang="en-GB" smtClean="0"/>
-              <a:t>04/04/2018</a:t>
+              <a:t>09/04/2018</a:t>
             </a:fld>
             <a:endParaRPr lang="en-GB"/>
           </a:p>
@@ -520,8 +521,107 @@
           <a:p>
             <a:r>
               <a:rPr lang="en-GB" dirty="0"/>
-              <a:t>In the first point remember to highlight how the tv series inspired you</a:t>
-            </a:r>
+              <a:t>About robotics(history of robot manipulators and mobile robots)</a:t>
+            </a:r>
+          </a:p>
+          <a:p>
+            <a:r>
+              <a:rPr lang="en-GB" dirty="0"/>
+              <a:t>The ROS frameworks</a:t>
+            </a:r>
+          </a:p>
+          <a:p>
+            <a:r>
+              <a:rPr lang="en-GB" dirty="0"/>
+              <a:t>Why mobile robots</a:t>
+            </a:r>
+          </a:p>
+          <a:p>
+            <a:r>
+              <a:rPr lang="en-GB" dirty="0"/>
+              <a:t>Robots for educational purposes-the need for mobile robots in schools_ to showcase robotics  and inspire young people(talk also about personal reasons for choosing such a project)</a:t>
+            </a:r>
+          </a:p>
+          <a:p>
+            <a:pPr marL="0" indent="0">
+              <a:buNone/>
+            </a:pPr>
+            <a:r>
+              <a:rPr lang="en-GB" dirty="0"/>
+              <a:t>2</a:t>
+            </a:r>
+          </a:p>
+          <a:p>
+            <a:pPr marL="0" indent="0">
+              <a:buNone/>
+            </a:pPr>
+            <a:r>
+              <a:rPr lang="en-GB" dirty="0"/>
+              <a:t>Current state of the Project</a:t>
+            </a:r>
+          </a:p>
+          <a:p>
+            <a:r>
+              <a:rPr lang="en-GB" dirty="0"/>
+              <a:t>Design of the mobile robot</a:t>
+            </a:r>
+          </a:p>
+          <a:p>
+            <a:r>
+              <a:rPr lang="en-GB" dirty="0"/>
+              <a:t>Design of the robot manipulator</a:t>
+            </a:r>
+          </a:p>
+          <a:p>
+            <a:r>
+              <a:rPr lang="en-GB" dirty="0"/>
+              <a:t>Talk about circuit</a:t>
+            </a:r>
+          </a:p>
+          <a:p>
+            <a:r>
+              <a:rPr lang="en-GB" dirty="0"/>
+              <a:t>Programming</a:t>
+            </a:r>
+          </a:p>
+          <a:p>
+            <a:r>
+              <a:rPr lang="en-GB" dirty="0"/>
+              <a:t>Interface of the app</a:t>
+            </a:r>
+          </a:p>
+          <a:p>
+            <a:r>
+              <a:rPr lang="en-GB" dirty="0"/>
+              <a:t>Add motive</a:t>
+            </a:r>
+          </a:p>
+          <a:p>
+            <a:r>
+              <a:rPr lang="en-GB" dirty="0"/>
+              <a:t>Add pictures</a:t>
+            </a:r>
+          </a:p>
+          <a:p>
+            <a:r>
+              <a:rPr lang="en-GB" dirty="0"/>
+              <a:t>Less text in slides</a:t>
+            </a:r>
+          </a:p>
+          <a:p>
+            <a:r>
+              <a:rPr lang="en-GB" dirty="0"/>
+              <a:t>Security access- case for relay</a:t>
+            </a:r>
+          </a:p>
+          <a:p>
+            <a:r>
+              <a:rPr lang="en-GB" dirty="0"/>
+              <a:t>What to do next</a:t>
+            </a:r>
+          </a:p>
+          <a:p>
+            <a:endParaRPr lang="en-GB" dirty="0"/>
           </a:p>
         </p:txBody>
       </p:sp>
@@ -542,7 +642,7 @@
           <a:p>
             <a:fld id="{93BB27F3-B6CB-4810-A86B-B5C3B88244AA}" type="slidenum">
               <a:rPr lang="en-GB" smtClean="0"/>
-              <a:t>3</a:t>
+              <a:t>2</a:t>
             </a:fld>
             <a:endParaRPr lang="en-GB"/>
           </a:p>
@@ -551,7 +651,7 @@
     </p:spTree>
     <p:extLst>
       <p:ext uri="{BB962C8B-B14F-4D97-AF65-F5344CB8AC3E}">
-        <p14:creationId xmlns:p14="http://schemas.microsoft.com/office/powerpoint/2010/main" val="1889679164"/>
+        <p14:creationId xmlns:p14="http://schemas.microsoft.com/office/powerpoint/2010/main" val="403790905"/>
       </p:ext>
     </p:extLst>
   </p:cSld>
@@ -605,6 +705,279 @@
           <a:bodyPr/>
           <a:lstStyle/>
           <a:p>
+            <a:r>
+              <a:rPr lang="en-GB" dirty="0"/>
+              <a:t>In the first point remember to highlight how the tv series inspired you</a:t>
+            </a:r>
+          </a:p>
+        </p:txBody>
+      </p:sp>
+      <p:sp>
+        <p:nvSpPr>
+          <p:cNvPr id="4" name="Slide Number Placeholder 3"/>
+          <p:cNvSpPr>
+            <a:spLocks noGrp="1"/>
+          </p:cNvSpPr>
+          <p:nvPr>
+            <p:ph type="sldNum" sz="quarter" idx="10"/>
+          </p:nvPr>
+        </p:nvSpPr>
+        <p:spPr/>
+        <p:txBody>
+          <a:bodyPr/>
+          <a:lstStyle/>
+          <a:p>
+            <a:fld id="{93BB27F3-B6CB-4810-A86B-B5C3B88244AA}" type="slidenum">
+              <a:rPr lang="en-GB" smtClean="0"/>
+              <a:t>3</a:t>
+            </a:fld>
+            <a:endParaRPr lang="en-GB"/>
+          </a:p>
+        </p:txBody>
+      </p:sp>
+    </p:spTree>
+    <p:extLst>
+      <p:ext uri="{BB962C8B-B14F-4D97-AF65-F5344CB8AC3E}">
+        <p14:creationId xmlns:p14="http://schemas.microsoft.com/office/powerpoint/2010/main" val="1889679164"/>
+      </p:ext>
+    </p:extLst>
+  </p:cSld>
+  <p:clrMapOvr>
+    <a:masterClrMapping/>
+  </p:clrMapOvr>
+</p:notes>
+</file>
+
+<file path=ppt/notesSlides/notesSlide3.xml><?xml version="1.0" encoding="utf-8"?>
+<p:notes xmlns:a="http://schemas.openxmlformats.org/drawingml/2006/main" xmlns:r="http://schemas.openxmlformats.org/officeDocument/2006/relationships" xmlns:p="http://schemas.openxmlformats.org/presentationml/2006/main">
+  <p:cSld>
+    <p:spTree>
+      <p:nvGrpSpPr>
+        <p:cNvPr id="1" name=""/>
+        <p:cNvGrpSpPr/>
+        <p:nvPr/>
+      </p:nvGrpSpPr>
+      <p:grpSpPr>
+        <a:xfrm>
+          <a:off x="0" y="0"/>
+          <a:ext cx="0" cy="0"/>
+          <a:chOff x="0" y="0"/>
+          <a:chExt cx="0" cy="0"/>
+        </a:xfrm>
+      </p:grpSpPr>
+      <p:sp>
+        <p:nvSpPr>
+          <p:cNvPr id="2" name="Slide Image Placeholder 1"/>
+          <p:cNvSpPr>
+            <a:spLocks noGrp="1" noRot="1" noChangeAspect="1"/>
+          </p:cNvSpPr>
+          <p:nvPr>
+            <p:ph type="sldImg"/>
+          </p:nvPr>
+        </p:nvSpPr>
+        <p:spPr/>
+      </p:sp>
+      <p:sp>
+        <p:nvSpPr>
+          <p:cNvPr id="3" name="Notes Placeholder 2"/>
+          <p:cNvSpPr>
+            <a:spLocks noGrp="1"/>
+          </p:cNvSpPr>
+          <p:nvPr>
+            <p:ph type="body" idx="1"/>
+          </p:nvPr>
+        </p:nvSpPr>
+        <p:spPr/>
+        <p:txBody>
+          <a:bodyPr/>
+          <a:lstStyle/>
+          <a:p>
+            <a:r>
+              <a:rPr lang="en-GB" dirty="0"/>
+              <a:t>Reason for interfacing a manipulator with a mobile robot is to showcase how a pick and place with teleoperation where one of the degree of freedom of the manipulator is the robot itself hence have a more rounder view of the world of robotics.</a:t>
+            </a:r>
+          </a:p>
+        </p:txBody>
+      </p:sp>
+      <p:sp>
+        <p:nvSpPr>
+          <p:cNvPr id="4" name="Slide Number Placeholder 3"/>
+          <p:cNvSpPr>
+            <a:spLocks noGrp="1"/>
+          </p:cNvSpPr>
+          <p:nvPr>
+            <p:ph type="sldNum" sz="quarter" idx="10"/>
+          </p:nvPr>
+        </p:nvSpPr>
+        <p:spPr/>
+        <p:txBody>
+          <a:bodyPr/>
+          <a:lstStyle/>
+          <a:p>
+            <a:fld id="{93BB27F3-B6CB-4810-A86B-B5C3B88244AA}" type="slidenum">
+              <a:rPr lang="en-GB" smtClean="0"/>
+              <a:t>4</a:t>
+            </a:fld>
+            <a:endParaRPr lang="en-GB"/>
+          </a:p>
+        </p:txBody>
+      </p:sp>
+    </p:spTree>
+    <p:extLst>
+      <p:ext uri="{BB962C8B-B14F-4D97-AF65-F5344CB8AC3E}">
+        <p14:creationId xmlns:p14="http://schemas.microsoft.com/office/powerpoint/2010/main" val="3864393109"/>
+      </p:ext>
+    </p:extLst>
+  </p:cSld>
+  <p:clrMapOvr>
+    <a:masterClrMapping/>
+  </p:clrMapOvr>
+</p:notes>
+</file>
+
+<file path=ppt/notesSlides/notesSlide4.xml><?xml version="1.0" encoding="utf-8"?>
+<p:notes xmlns:a="http://schemas.openxmlformats.org/drawingml/2006/main" xmlns:r="http://schemas.openxmlformats.org/officeDocument/2006/relationships" xmlns:p="http://schemas.openxmlformats.org/presentationml/2006/main">
+  <p:cSld>
+    <p:spTree>
+      <p:nvGrpSpPr>
+        <p:cNvPr id="1" name=""/>
+        <p:cNvGrpSpPr/>
+        <p:nvPr/>
+      </p:nvGrpSpPr>
+      <p:grpSpPr>
+        <a:xfrm>
+          <a:off x="0" y="0"/>
+          <a:ext cx="0" cy="0"/>
+          <a:chOff x="0" y="0"/>
+          <a:chExt cx="0" cy="0"/>
+        </a:xfrm>
+      </p:grpSpPr>
+      <p:sp>
+        <p:nvSpPr>
+          <p:cNvPr id="2" name="Slide Image Placeholder 1"/>
+          <p:cNvSpPr>
+            <a:spLocks noGrp="1" noRot="1" noChangeAspect="1"/>
+          </p:cNvSpPr>
+          <p:nvPr>
+            <p:ph type="sldImg"/>
+          </p:nvPr>
+        </p:nvSpPr>
+        <p:spPr/>
+      </p:sp>
+      <p:sp>
+        <p:nvSpPr>
+          <p:cNvPr id="3" name="Notes Placeholder 2"/>
+          <p:cNvSpPr>
+            <a:spLocks noGrp="1"/>
+          </p:cNvSpPr>
+          <p:nvPr>
+            <p:ph type="body" idx="1"/>
+          </p:nvPr>
+        </p:nvSpPr>
+        <p:spPr/>
+        <p:txBody>
+          <a:bodyPr/>
+          <a:lstStyle/>
+          <a:p>
+            <a:r>
+              <a:rPr lang="en-GB" dirty="0"/>
+              <a:t>-define what mobile robots are</a:t>
+            </a:r>
+          </a:p>
+          <a:p>
+            <a:r>
+              <a:rPr lang="en-GB" dirty="0"/>
+              <a:t>-talk through the ROS framework</a:t>
+            </a:r>
+          </a:p>
+          <a:p>
+            <a:r>
+              <a:rPr lang="en-GB" dirty="0"/>
+              <a:t>-Highlight the need of teaching robotics </a:t>
+            </a:r>
+          </a:p>
+        </p:txBody>
+      </p:sp>
+      <p:sp>
+        <p:nvSpPr>
+          <p:cNvPr id="4" name="Slide Number Placeholder 3"/>
+          <p:cNvSpPr>
+            <a:spLocks noGrp="1"/>
+          </p:cNvSpPr>
+          <p:nvPr>
+            <p:ph type="sldNum" sz="quarter" idx="10"/>
+          </p:nvPr>
+        </p:nvSpPr>
+        <p:spPr/>
+        <p:txBody>
+          <a:bodyPr/>
+          <a:lstStyle/>
+          <a:p>
+            <a:fld id="{93BB27F3-B6CB-4810-A86B-B5C3B88244AA}" type="slidenum">
+              <a:rPr lang="en-GB" smtClean="0"/>
+              <a:t>5</a:t>
+            </a:fld>
+            <a:endParaRPr lang="en-GB"/>
+          </a:p>
+        </p:txBody>
+      </p:sp>
+    </p:spTree>
+    <p:extLst>
+      <p:ext uri="{BB962C8B-B14F-4D97-AF65-F5344CB8AC3E}">
+        <p14:creationId xmlns:p14="http://schemas.microsoft.com/office/powerpoint/2010/main" val="2102018952"/>
+      </p:ext>
+    </p:extLst>
+  </p:cSld>
+  <p:clrMapOvr>
+    <a:masterClrMapping/>
+  </p:clrMapOvr>
+</p:notes>
+</file>
+
+<file path=ppt/notesSlides/notesSlide5.xml><?xml version="1.0" encoding="utf-8"?>
+<p:notes xmlns:a="http://schemas.openxmlformats.org/drawingml/2006/main" xmlns:r="http://schemas.openxmlformats.org/officeDocument/2006/relationships" xmlns:p="http://schemas.openxmlformats.org/presentationml/2006/main">
+  <p:cSld>
+    <p:spTree>
+      <p:nvGrpSpPr>
+        <p:cNvPr id="1" name=""/>
+        <p:cNvGrpSpPr/>
+        <p:nvPr/>
+      </p:nvGrpSpPr>
+      <p:grpSpPr>
+        <a:xfrm>
+          <a:off x="0" y="0"/>
+          <a:ext cx="0" cy="0"/>
+          <a:chOff x="0" y="0"/>
+          <a:chExt cx="0" cy="0"/>
+        </a:xfrm>
+      </p:grpSpPr>
+      <p:sp>
+        <p:nvSpPr>
+          <p:cNvPr id="2" name="Slide Image Placeholder 1"/>
+          <p:cNvSpPr>
+            <a:spLocks noGrp="1" noRot="1" noChangeAspect="1"/>
+          </p:cNvSpPr>
+          <p:nvPr>
+            <p:ph type="sldImg"/>
+          </p:nvPr>
+        </p:nvSpPr>
+        <p:spPr/>
+      </p:sp>
+      <p:sp>
+        <p:nvSpPr>
+          <p:cNvPr id="3" name="Notes Placeholder 2"/>
+          <p:cNvSpPr>
+            <a:spLocks noGrp="1"/>
+          </p:cNvSpPr>
+          <p:nvPr>
+            <p:ph type="body" idx="1"/>
+          </p:nvPr>
+        </p:nvSpPr>
+        <p:spPr/>
+        <p:txBody>
+          <a:bodyPr/>
+          <a:lstStyle/>
+          <a:p>
             <a:pPr marL="0" marR="0" lvl="0" indent="0" algn="l" defTabSz="914400" rtl="0" eaLnBrk="1" fontAlgn="auto" latinLnBrk="0" hangingPunct="1">
               <a:lnSpc>
                 <a:spcPct val="100000"/>
@@ -649,7 +1022,7 @@
           <a:p>
             <a:fld id="{93BB27F3-B6CB-4810-A86B-B5C3B88244AA}" type="slidenum">
               <a:rPr lang="en-GB" smtClean="0"/>
-              <a:t>10</a:t>
+              <a:t>11</a:t>
             </a:fld>
             <a:endParaRPr lang="en-GB"/>
           </a:p>
@@ -817,7 +1190,7 @@
           <a:p>
             <a:fld id="{6634FDEA-348A-464B-A1A4-78EC561600A5}" type="datetimeFigureOut">
               <a:rPr lang="en-GB" smtClean="0"/>
-              <a:t>04/04/2018</a:t>
+              <a:t>09/04/2018</a:t>
             </a:fld>
             <a:endParaRPr lang="en-GB"/>
           </a:p>
@@ -1017,7 +1390,7 @@
           <a:p>
             <a:fld id="{6634FDEA-348A-464B-A1A4-78EC561600A5}" type="datetimeFigureOut">
               <a:rPr lang="en-GB" smtClean="0"/>
-              <a:t>04/04/2018</a:t>
+              <a:t>09/04/2018</a:t>
             </a:fld>
             <a:endParaRPr lang="en-GB"/>
           </a:p>
@@ -1227,7 +1600,7 @@
           <a:p>
             <a:fld id="{6634FDEA-348A-464B-A1A4-78EC561600A5}" type="datetimeFigureOut">
               <a:rPr lang="en-GB" smtClean="0"/>
-              <a:t>04/04/2018</a:t>
+              <a:t>09/04/2018</a:t>
             </a:fld>
             <a:endParaRPr lang="en-GB"/>
           </a:p>
@@ -1427,7 +1800,7 @@
           <a:p>
             <a:fld id="{6634FDEA-348A-464B-A1A4-78EC561600A5}" type="datetimeFigureOut">
               <a:rPr lang="en-GB" smtClean="0"/>
-              <a:t>04/04/2018</a:t>
+              <a:t>09/04/2018</a:t>
             </a:fld>
             <a:endParaRPr lang="en-GB"/>
           </a:p>
@@ -1703,7 +2076,7 @@
           <a:p>
             <a:fld id="{6634FDEA-348A-464B-A1A4-78EC561600A5}" type="datetimeFigureOut">
               <a:rPr lang="en-GB" smtClean="0"/>
-              <a:t>04/04/2018</a:t>
+              <a:t>09/04/2018</a:t>
             </a:fld>
             <a:endParaRPr lang="en-GB"/>
           </a:p>
@@ -1971,7 +2344,7 @@
           <a:p>
             <a:fld id="{6634FDEA-348A-464B-A1A4-78EC561600A5}" type="datetimeFigureOut">
               <a:rPr lang="en-GB" smtClean="0"/>
-              <a:t>04/04/2018</a:t>
+              <a:t>09/04/2018</a:t>
             </a:fld>
             <a:endParaRPr lang="en-GB"/>
           </a:p>
@@ -2386,7 +2759,7 @@
           <a:p>
             <a:fld id="{6634FDEA-348A-464B-A1A4-78EC561600A5}" type="datetimeFigureOut">
               <a:rPr lang="en-GB" smtClean="0"/>
-              <a:t>04/04/2018</a:t>
+              <a:t>09/04/2018</a:t>
             </a:fld>
             <a:endParaRPr lang="en-GB"/>
           </a:p>
@@ -2528,7 +2901,7 @@
           <a:p>
             <a:fld id="{6634FDEA-348A-464B-A1A4-78EC561600A5}" type="datetimeFigureOut">
               <a:rPr lang="en-GB" smtClean="0"/>
-              <a:t>04/04/2018</a:t>
+              <a:t>09/04/2018</a:t>
             </a:fld>
             <a:endParaRPr lang="en-GB"/>
           </a:p>
@@ -2641,7 +3014,7 @@
           <a:p>
             <a:fld id="{6634FDEA-348A-464B-A1A4-78EC561600A5}" type="datetimeFigureOut">
               <a:rPr lang="en-GB" smtClean="0"/>
-              <a:t>04/04/2018</a:t>
+              <a:t>09/04/2018</a:t>
             </a:fld>
             <a:endParaRPr lang="en-GB"/>
           </a:p>
@@ -2954,7 +3327,7 @@
           <a:p>
             <a:fld id="{6634FDEA-348A-464B-A1A4-78EC561600A5}" type="datetimeFigureOut">
               <a:rPr lang="en-GB" smtClean="0"/>
-              <a:t>04/04/2018</a:t>
+              <a:t>09/04/2018</a:t>
             </a:fld>
             <a:endParaRPr lang="en-GB"/>
           </a:p>
@@ -3243,7 +3616,7 @@
           <a:p>
             <a:fld id="{6634FDEA-348A-464B-A1A4-78EC561600A5}" type="datetimeFigureOut">
               <a:rPr lang="en-GB" smtClean="0"/>
-              <a:t>04/04/2018</a:t>
+              <a:t>09/04/2018</a:t>
             </a:fld>
             <a:endParaRPr lang="en-GB"/>
           </a:p>
@@ -3486,7 +3859,7 @@
           <a:p>
             <a:fld id="{6634FDEA-348A-464B-A1A4-78EC561600A5}" type="datetimeFigureOut">
               <a:rPr lang="en-GB" smtClean="0"/>
-              <a:t>04/04/2018</a:t>
+              <a:t>09/04/2018</a:t>
             </a:fld>
             <a:endParaRPr lang="en-GB"/>
           </a:p>
@@ -4099,6 +4472,89 @@
           <p:cNvPr id="2" name="Title 1">
             <a:extLst>
               <a:ext uri="{FF2B5EF4-FFF2-40B4-BE49-F238E27FC236}">
+                <a16:creationId xmlns:a16="http://schemas.microsoft.com/office/drawing/2014/main" id="{B054E0AB-E791-441F-A4E4-2DBCCB409B57}"/>
+              </a:ext>
+            </a:extLst>
+          </p:cNvPr>
+          <p:cNvSpPr>
+            <a:spLocks noGrp="1"/>
+          </p:cNvSpPr>
+          <p:nvPr>
+            <p:ph type="title"/>
+          </p:nvPr>
+        </p:nvSpPr>
+        <p:spPr/>
+        <p:txBody>
+          <a:bodyPr/>
+          <a:lstStyle/>
+          <a:p>
+            <a:r>
+              <a:rPr lang="en-GB" dirty="0"/>
+              <a:t>Testing and validation</a:t>
+            </a:r>
+          </a:p>
+        </p:txBody>
+      </p:sp>
+      <p:sp>
+        <p:nvSpPr>
+          <p:cNvPr id="3" name="Content Placeholder 2">
+            <a:extLst>
+              <a:ext uri="{FF2B5EF4-FFF2-40B4-BE49-F238E27FC236}">
+                <a16:creationId xmlns:a16="http://schemas.microsoft.com/office/drawing/2014/main" id="{9317DFF7-96E0-4390-A1B6-C1A0B6F472E3}"/>
+              </a:ext>
+            </a:extLst>
+          </p:cNvPr>
+          <p:cNvSpPr>
+            <a:spLocks noGrp="1"/>
+          </p:cNvSpPr>
+          <p:nvPr>
+            <p:ph idx="1"/>
+          </p:nvPr>
+        </p:nvSpPr>
+        <p:spPr/>
+        <p:txBody>
+          <a:bodyPr/>
+          <a:lstStyle/>
+          <a:p>
+            <a:endParaRPr lang="en-GB" dirty="0"/>
+          </a:p>
+        </p:txBody>
+      </p:sp>
+    </p:spTree>
+    <p:extLst>
+      <p:ext uri="{BB962C8B-B14F-4D97-AF65-F5344CB8AC3E}">
+        <p14:creationId xmlns:p14="http://schemas.microsoft.com/office/powerpoint/2010/main" val="3534495692"/>
+      </p:ext>
+    </p:extLst>
+  </p:cSld>
+  <p:clrMapOvr>
+    <a:masterClrMapping/>
+  </p:clrMapOvr>
+</p:sld>
+</file>
+
+<file path=ppt/slides/slide11.xml><?xml version="1.0" encoding="utf-8"?>
+<p:sld xmlns:a="http://schemas.openxmlformats.org/drawingml/2006/main" xmlns:r="http://schemas.openxmlformats.org/officeDocument/2006/relationships" xmlns:p="http://schemas.openxmlformats.org/presentationml/2006/main">
+  <p:cSld>
+    <p:spTree>
+      <p:nvGrpSpPr>
+        <p:cNvPr id="1" name=""/>
+        <p:cNvGrpSpPr/>
+        <p:nvPr/>
+      </p:nvGrpSpPr>
+      <p:grpSpPr>
+        <a:xfrm>
+          <a:off x="0" y="0"/>
+          <a:ext cx="0" cy="0"/>
+          <a:chOff x="0" y="0"/>
+          <a:chExt cx="0" cy="0"/>
+        </a:xfrm>
+      </p:grpSpPr>
+      <p:sp>
+        <p:nvSpPr>
+          <p:cNvPr id="2" name="Title 1">
+            <a:extLst>
+              <a:ext uri="{FF2B5EF4-FFF2-40B4-BE49-F238E27FC236}">
                 <a16:creationId xmlns:a16="http://schemas.microsoft.com/office/drawing/2014/main" id="{81856E0F-6700-403C-AC07-E6225785A2E3}"/>
               </a:ext>
             </a:extLst>
@@ -4215,7 +4671,7 @@
           <a:p>
             <a:r>
               <a:rPr lang="en-GB" dirty="0"/>
-              <a:t>content</a:t>
+              <a:t>Content</a:t>
             </a:r>
           </a:p>
         </p:txBody>
@@ -4239,121 +4695,13 @@
         <p:spPr/>
         <p:txBody>
           <a:bodyPr>
-            <a:normAutofit fontScale="40000" lnSpcReduction="20000"/>
+            <a:normAutofit/>
           </a:bodyPr>
           <a:lstStyle/>
           <a:p>
             <a:pPr marL="0" indent="0">
               <a:buNone/>
             </a:pPr>
-            <a:r>
-              <a:rPr lang="en-GB" dirty="0"/>
-              <a:t>1</a:t>
-            </a:r>
-          </a:p>
-          <a:p>
-            <a:r>
-              <a:rPr lang="en-GB" dirty="0"/>
-              <a:t>About robotics(history of robot manipulators and mobile robots)</a:t>
-            </a:r>
-          </a:p>
-          <a:p>
-            <a:r>
-              <a:rPr lang="en-GB" dirty="0"/>
-              <a:t>The ROS frameworks</a:t>
-            </a:r>
-          </a:p>
-          <a:p>
-            <a:r>
-              <a:rPr lang="en-GB" dirty="0"/>
-              <a:t>Why mobile robots</a:t>
-            </a:r>
-          </a:p>
-          <a:p>
-            <a:r>
-              <a:rPr lang="en-GB" dirty="0"/>
-              <a:t>Robots for educational purposes-the need for mobile robots in schools_ to showcase robotics  and inspire young people(talk also about personal reasons for choosing such a project)</a:t>
-            </a:r>
-          </a:p>
-          <a:p>
-            <a:pPr marL="0" indent="0">
-              <a:buNone/>
-            </a:pPr>
-            <a:r>
-              <a:rPr lang="en-GB" dirty="0"/>
-              <a:t>2</a:t>
-            </a:r>
-          </a:p>
-          <a:p>
-            <a:pPr marL="0" indent="0">
-              <a:buNone/>
-            </a:pPr>
-            <a:r>
-              <a:rPr lang="en-GB" dirty="0"/>
-              <a:t>Current state of the Project</a:t>
-            </a:r>
-          </a:p>
-          <a:p>
-            <a:r>
-              <a:rPr lang="en-GB" dirty="0"/>
-              <a:t>Design of the mobile robot</a:t>
-            </a:r>
-          </a:p>
-          <a:p>
-            <a:r>
-              <a:rPr lang="en-GB" dirty="0"/>
-              <a:t>Design of the robot manipulator</a:t>
-            </a:r>
-          </a:p>
-          <a:p>
-            <a:r>
-              <a:rPr lang="en-GB" dirty="0"/>
-              <a:t>Talk about circuit</a:t>
-            </a:r>
-          </a:p>
-          <a:p>
-            <a:r>
-              <a:rPr lang="en-GB" dirty="0"/>
-              <a:t>Programming</a:t>
-            </a:r>
-          </a:p>
-          <a:p>
-            <a:r>
-              <a:rPr lang="en-GB" dirty="0"/>
-              <a:t>Interface of the app</a:t>
-            </a:r>
-          </a:p>
-          <a:p>
-            <a:r>
-              <a:rPr lang="en-GB" dirty="0"/>
-              <a:t>Add motive</a:t>
-            </a:r>
-          </a:p>
-          <a:p>
-            <a:r>
-              <a:rPr lang="en-GB" dirty="0"/>
-              <a:t>Add pictures</a:t>
-            </a:r>
-          </a:p>
-          <a:p>
-            <a:r>
-              <a:rPr lang="en-GB" dirty="0"/>
-              <a:t>Less text in slides</a:t>
-            </a:r>
-          </a:p>
-          <a:p>
-            <a:r>
-              <a:rPr lang="en-GB" dirty="0"/>
-              <a:t>Security access- case for relay</a:t>
-            </a:r>
-          </a:p>
-          <a:p>
-            <a:r>
-              <a:rPr lang="en-GB" dirty="0"/>
-              <a:t>What to do next</a:t>
-            </a:r>
-          </a:p>
-          <a:p>
             <a:endParaRPr lang="en-GB" dirty="0"/>
           </a:p>
         </p:txBody>
@@ -4432,15 +4780,20 @@
             <p:ph idx="1"/>
           </p:nvPr>
         </p:nvSpPr>
-        <p:spPr/>
-        <p:txBody>
-          <a:bodyPr/>
-          <a:lstStyle/>
-          <a:p>
-            <a:r>
-              <a:rPr lang="en-GB" dirty="0"/>
-              <a:t>Personally as a child I was inspired by inspector gadget</a:t>
-            </a:r>
+        <p:spPr>
+          <a:xfrm>
+            <a:off x="838200" y="1027906"/>
+            <a:ext cx="10515600" cy="4417412"/>
+          </a:xfrm>
+        </p:spPr>
+        <p:txBody>
+          <a:bodyPr/>
+          <a:lstStyle/>
+          <a:p>
+            <a:pPr marL="0" indent="0">
+              <a:buNone/>
+            </a:pPr>
+            <a:endParaRPr lang="en-GB" dirty="0"/>
           </a:p>
           <a:p>
             <a:r>
@@ -4461,6 +4814,9 @@
             </a:r>
           </a:p>
           <a:p>
+            <a:pPr marL="0" indent="0">
+              <a:buNone/>
+            </a:pPr>
             <a:endParaRPr lang="en-GB" dirty="0"/>
           </a:p>
           <a:p>
@@ -4468,6 +4824,136 @@
           </a:p>
         </p:txBody>
       </p:sp>
+      <p:pic>
+        <p:nvPicPr>
+          <p:cNvPr id="4" name="Picture 3">
+            <a:extLst>
+              <a:ext uri="{FF2B5EF4-FFF2-40B4-BE49-F238E27FC236}">
+                <a16:creationId xmlns:a16="http://schemas.microsoft.com/office/drawing/2014/main" id="{D5CBA893-8E5E-458E-A2B4-35F3276C9C6F}"/>
+              </a:ext>
+            </a:extLst>
+          </p:cNvPr>
+          <p:cNvPicPr>
+            <a:picLocks noChangeAspect="1"/>
+          </p:cNvPicPr>
+          <p:nvPr/>
+        </p:nvPicPr>
+        <p:blipFill>
+          <a:blip r:embed="rId3">
+            <a:extLst>
+              <a:ext uri="{28A0092B-C50C-407E-A947-70E740481C1C}">
+                <a14:useLocalDpi xmlns:a14="http://schemas.microsoft.com/office/drawing/2010/main" val="0"/>
+              </a:ext>
+            </a:extLst>
+          </a:blip>
+          <a:stretch>
+            <a:fillRect/>
+          </a:stretch>
+        </p:blipFill>
+        <p:spPr>
+          <a:xfrm>
+            <a:off x="194361" y="4173922"/>
+            <a:ext cx="2474194" cy="2251961"/>
+          </a:xfrm>
+          <a:prstGeom prst="rect">
+            <a:avLst/>
+          </a:prstGeom>
+        </p:spPr>
+      </p:pic>
+      <p:pic>
+        <p:nvPicPr>
+          <p:cNvPr id="1026" name="Picture 2" descr="Image result for google autonomous car 2018">
+            <a:extLst>
+              <a:ext uri="{FF2B5EF4-FFF2-40B4-BE49-F238E27FC236}">
+                <a16:creationId xmlns:a16="http://schemas.microsoft.com/office/drawing/2014/main" id="{6DBCC91E-4652-4626-8A36-1078EB79457A}"/>
+              </a:ext>
+            </a:extLst>
+          </p:cNvPr>
+          <p:cNvPicPr>
+            <a:picLocks noChangeAspect="1" noChangeArrowheads="1"/>
+          </p:cNvPicPr>
+          <p:nvPr/>
+        </p:nvPicPr>
+        <p:blipFill>
+          <a:blip r:embed="rId4">
+            <a:extLst>
+              <a:ext uri="{28A0092B-C50C-407E-A947-70E740481C1C}">
+                <a14:useLocalDpi xmlns:a14="http://schemas.microsoft.com/office/drawing/2010/main" val="0"/>
+              </a:ext>
+            </a:extLst>
+          </a:blip>
+          <a:srcRect/>
+          <a:stretch>
+            <a:fillRect/>
+          </a:stretch>
+        </p:blipFill>
+        <p:spPr bwMode="auto">
+          <a:xfrm>
+            <a:off x="3371461" y="4148828"/>
+            <a:ext cx="4282751" cy="2248444"/>
+          </a:xfrm>
+          <a:prstGeom prst="rect">
+            <a:avLst/>
+          </a:prstGeom>
+          <a:noFill/>
+          <a:extLst>
+            <a:ext uri="{909E8E84-426E-40DD-AFC4-6F175D3DCCD1}">
+              <a14:hiddenFill xmlns:a14="http://schemas.microsoft.com/office/drawing/2010/main">
+                <a:solidFill>
+                  <a:srgbClr val="FFFFFF"/>
+                </a:solidFill>
+              </a14:hiddenFill>
+            </a:ext>
+          </a:extLst>
+        </p:spPr>
+      </p:pic>
+      <p:pic>
+        <p:nvPicPr>
+          <p:cNvPr id="1028" name="Picture 4" descr="Image result for autonomous car future design">
+            <a:extLst>
+              <a:ext uri="{FF2B5EF4-FFF2-40B4-BE49-F238E27FC236}">
+                <a16:creationId xmlns:a16="http://schemas.microsoft.com/office/drawing/2014/main" id="{A32ECB33-CFEB-4126-90FB-52C10B37B4DE}"/>
+              </a:ext>
+            </a:extLst>
+          </p:cNvPr>
+          <p:cNvPicPr>
+            <a:picLocks noChangeAspect="1" noChangeArrowheads="1"/>
+          </p:cNvPicPr>
+          <p:nvPr/>
+        </p:nvPicPr>
+        <p:blipFill>
+          <a:blip r:embed="rId5">
+            <a:extLst>
+              <a:ext uri="{28A0092B-C50C-407E-A947-70E740481C1C}">
+                <a14:useLocalDpi xmlns:a14="http://schemas.microsoft.com/office/drawing/2010/main" val="0"/>
+              </a:ext>
+            </a:extLst>
+          </a:blip>
+          <a:srcRect/>
+          <a:stretch>
+            <a:fillRect/>
+          </a:stretch>
+        </p:blipFill>
+        <p:spPr bwMode="auto">
+          <a:xfrm>
+            <a:off x="8059428" y="4173922"/>
+            <a:ext cx="3938211" cy="2223350"/>
+          </a:xfrm>
+          <a:prstGeom prst="rect">
+            <a:avLst/>
+          </a:prstGeom>
+          <a:noFill/>
+          <a:extLst>
+            <a:ext uri="{909E8E84-426E-40DD-AFC4-6F175D3DCCD1}">
+              <a14:hiddenFill xmlns:a14="http://schemas.microsoft.com/office/drawing/2010/main">
+                <a:solidFill>
+                  <a:srgbClr val="FFFFFF"/>
+                </a:solidFill>
+              </a14:hiddenFill>
+            </a:ext>
+          </a:extLst>
+        </p:spPr>
+      </p:pic>
     </p:spTree>
     <p:extLst>
       <p:ext uri="{BB962C8B-B14F-4D97-AF65-F5344CB8AC3E}">
@@ -4555,13 +5041,13 @@
           <a:p>
             <a:r>
               <a:rPr lang="en-GB" dirty="0"/>
-              <a:t>Building a robot manipulator </a:t>
+              <a:t>Making a user interface to allow understanding of the basic functions of the robot</a:t>
             </a:r>
           </a:p>
           <a:p>
             <a:r>
               <a:rPr lang="en-GB" dirty="0"/>
-              <a:t>Making a user interface to allow understanding of the basic functions of the robot</a:t>
+              <a:t>Interface mobile robot with a robot manipulator </a:t>
             </a:r>
           </a:p>
           <a:p>
@@ -4797,6 +5283,86 @@
           <p:cNvPr id="2" name="Title 1">
             <a:extLst>
               <a:ext uri="{FF2B5EF4-FFF2-40B4-BE49-F238E27FC236}">
+                <a16:creationId xmlns:a16="http://schemas.microsoft.com/office/drawing/2014/main" id="{AA562A12-564C-4011-AB82-D757C3B2201C}"/>
+              </a:ext>
+            </a:extLst>
+          </p:cNvPr>
+          <p:cNvSpPr>
+            <a:spLocks noGrp="1"/>
+          </p:cNvSpPr>
+          <p:nvPr>
+            <p:ph type="title"/>
+          </p:nvPr>
+        </p:nvSpPr>
+        <p:spPr/>
+        <p:txBody>
+          <a:bodyPr/>
+          <a:lstStyle/>
+          <a:p>
+            <a:endParaRPr lang="en-GB" dirty="0"/>
+          </a:p>
+        </p:txBody>
+      </p:sp>
+      <p:sp>
+        <p:nvSpPr>
+          <p:cNvPr id="3" name="Content Placeholder 2">
+            <a:extLst>
+              <a:ext uri="{FF2B5EF4-FFF2-40B4-BE49-F238E27FC236}">
+                <a16:creationId xmlns:a16="http://schemas.microsoft.com/office/drawing/2014/main" id="{756F54BD-EA79-4229-B17F-F703B686370D}"/>
+              </a:ext>
+            </a:extLst>
+          </p:cNvPr>
+          <p:cNvSpPr>
+            <a:spLocks noGrp="1"/>
+          </p:cNvSpPr>
+          <p:nvPr>
+            <p:ph idx="1"/>
+          </p:nvPr>
+        </p:nvSpPr>
+        <p:spPr/>
+        <p:txBody>
+          <a:bodyPr/>
+          <a:lstStyle/>
+          <a:p>
+            <a:endParaRPr lang="en-GB"/>
+          </a:p>
+        </p:txBody>
+      </p:sp>
+    </p:spTree>
+    <p:extLst>
+      <p:ext uri="{BB962C8B-B14F-4D97-AF65-F5344CB8AC3E}">
+        <p14:creationId xmlns:p14="http://schemas.microsoft.com/office/powerpoint/2010/main" val="4258498322"/>
+      </p:ext>
+    </p:extLst>
+  </p:cSld>
+  <p:clrMapOvr>
+    <a:masterClrMapping/>
+  </p:clrMapOvr>
+</p:sld>
+</file>
+
+<file path=ppt/slides/slide8.xml><?xml version="1.0" encoding="utf-8"?>
+<p:sld xmlns:a="http://schemas.openxmlformats.org/drawingml/2006/main" xmlns:r="http://schemas.openxmlformats.org/officeDocument/2006/relationships" xmlns:p="http://schemas.openxmlformats.org/presentationml/2006/main">
+  <p:cSld>
+    <p:spTree>
+      <p:nvGrpSpPr>
+        <p:cNvPr id="1" name=""/>
+        <p:cNvGrpSpPr/>
+        <p:nvPr/>
+      </p:nvGrpSpPr>
+      <p:grpSpPr>
+        <a:xfrm>
+          <a:off x="0" y="0"/>
+          <a:ext cx="0" cy="0"/>
+          <a:chOff x="0" y="0"/>
+          <a:chExt cx="0" cy="0"/>
+        </a:xfrm>
+      </p:grpSpPr>
+      <p:sp>
+        <p:nvSpPr>
+          <p:cNvPr id="2" name="Title 1">
+            <a:extLst>
+              <a:ext uri="{FF2B5EF4-FFF2-40B4-BE49-F238E27FC236}">
                 <a16:creationId xmlns:a16="http://schemas.microsoft.com/office/drawing/2014/main" id="{630E692D-234C-451F-80BB-C3AAE0B486B6}"/>
               </a:ext>
             </a:extLst>
@@ -4861,7 +5427,7 @@
 </p:sld>
 </file>
 
-<file path=ppt/slides/slide8.xml><?xml version="1.0" encoding="utf-8"?>
+<file path=ppt/slides/slide9.xml><?xml version="1.0" encoding="utf-8"?>
 <p:sld xmlns:a="http://schemas.openxmlformats.org/drawingml/2006/main" xmlns:r="http://schemas.openxmlformats.org/officeDocument/2006/relationships" xmlns:p="http://schemas.openxmlformats.org/presentationml/2006/main">
   <p:cSld>
     <p:spTree>
@@ -5003,89 +5569,6 @@
     <p:extLst>
       <p:ext uri="{BB962C8B-B14F-4D97-AF65-F5344CB8AC3E}">
         <p14:creationId xmlns:p14="http://schemas.microsoft.com/office/powerpoint/2010/main" val="35480381"/>
-      </p:ext>
-    </p:extLst>
-  </p:cSld>
-  <p:clrMapOvr>
-    <a:masterClrMapping/>
-  </p:clrMapOvr>
-</p:sld>
-</file>
-
-<file path=ppt/slides/slide9.xml><?xml version="1.0" encoding="utf-8"?>
-<p:sld xmlns:a="http://schemas.openxmlformats.org/drawingml/2006/main" xmlns:r="http://schemas.openxmlformats.org/officeDocument/2006/relationships" xmlns:p="http://schemas.openxmlformats.org/presentationml/2006/main">
-  <p:cSld>
-    <p:spTree>
-      <p:nvGrpSpPr>
-        <p:cNvPr id="1" name=""/>
-        <p:cNvGrpSpPr/>
-        <p:nvPr/>
-      </p:nvGrpSpPr>
-      <p:grpSpPr>
-        <a:xfrm>
-          <a:off x="0" y="0"/>
-          <a:ext cx="0" cy="0"/>
-          <a:chOff x="0" y="0"/>
-          <a:chExt cx="0" cy="0"/>
-        </a:xfrm>
-      </p:grpSpPr>
-      <p:sp>
-        <p:nvSpPr>
-          <p:cNvPr id="2" name="Title 1">
-            <a:extLst>
-              <a:ext uri="{FF2B5EF4-FFF2-40B4-BE49-F238E27FC236}">
-                <a16:creationId xmlns:a16="http://schemas.microsoft.com/office/drawing/2014/main" id="{B054E0AB-E791-441F-A4E4-2DBCCB409B57}"/>
-              </a:ext>
-            </a:extLst>
-          </p:cNvPr>
-          <p:cNvSpPr>
-            <a:spLocks noGrp="1"/>
-          </p:cNvSpPr>
-          <p:nvPr>
-            <p:ph type="title"/>
-          </p:nvPr>
-        </p:nvSpPr>
-        <p:spPr/>
-        <p:txBody>
-          <a:bodyPr/>
-          <a:lstStyle/>
-          <a:p>
-            <a:r>
-              <a:rPr lang="en-GB" dirty="0"/>
-              <a:t>Testing and validation</a:t>
-            </a:r>
-          </a:p>
-        </p:txBody>
-      </p:sp>
-      <p:sp>
-        <p:nvSpPr>
-          <p:cNvPr id="3" name="Content Placeholder 2">
-            <a:extLst>
-              <a:ext uri="{FF2B5EF4-FFF2-40B4-BE49-F238E27FC236}">
-                <a16:creationId xmlns:a16="http://schemas.microsoft.com/office/drawing/2014/main" id="{9317DFF7-96E0-4390-A1B6-C1A0B6F472E3}"/>
-              </a:ext>
-            </a:extLst>
-          </p:cNvPr>
-          <p:cNvSpPr>
-            <a:spLocks noGrp="1"/>
-          </p:cNvSpPr>
-          <p:nvPr>
-            <p:ph idx="1"/>
-          </p:nvPr>
-        </p:nvSpPr>
-        <p:spPr/>
-        <p:txBody>
-          <a:bodyPr/>
-          <a:lstStyle/>
-          <a:p>
-            <a:endParaRPr lang="en-GB" dirty="0"/>
-          </a:p>
-        </p:txBody>
-      </p:sp>
-    </p:spTree>
-    <p:extLst>
-      <p:ext uri="{BB962C8B-B14F-4D97-AF65-F5344CB8AC3E}">
-        <p14:creationId xmlns:p14="http://schemas.microsoft.com/office/powerpoint/2010/main" val="3534495692"/>
       </p:ext>
     </p:extLst>
   </p:cSld>

</xml_diff>

<commit_message>
added pictures of initial and current design-edited presentation
</commit_message>
<xml_diff>
--- a/MajorProject/majorProjectPresentation.pptx
+++ b/MajorProject/majorProjectPresentation.pptx
@@ -2,23 +2,22 @@
 <file path=ppt/presentation.xml><?xml version="1.0" encoding="utf-8"?>
 <p:presentation xmlns:a="http://schemas.openxmlformats.org/drawingml/2006/main" xmlns:r="http://schemas.openxmlformats.org/officeDocument/2006/relationships" xmlns:p="http://schemas.openxmlformats.org/presentationml/2006/main" saveSubsetFonts="1">
   <p:sldMasterIdLst>
-    <p:sldMasterId id="2147483729" r:id="rId1"/>
+    <p:sldMasterId id="2147483789" r:id="rId1"/>
   </p:sldMasterIdLst>
   <p:notesMasterIdLst>
-    <p:notesMasterId r:id="rId13"/>
+    <p:notesMasterId r:id="rId12"/>
   </p:notesMasterIdLst>
   <p:sldIdLst>
     <p:sldId id="256" r:id="rId2"/>
-    <p:sldId id="257" r:id="rId3"/>
-    <p:sldId id="258" r:id="rId4"/>
-    <p:sldId id="259" r:id="rId5"/>
-    <p:sldId id="260" r:id="rId6"/>
-    <p:sldId id="261" r:id="rId7"/>
+    <p:sldId id="258" r:id="rId3"/>
+    <p:sldId id="259" r:id="rId4"/>
+    <p:sldId id="260" r:id="rId5"/>
+    <p:sldId id="261" r:id="rId6"/>
+    <p:sldId id="267" r:id="rId7"/>
     <p:sldId id="266" r:id="rId8"/>
-    <p:sldId id="262" r:id="rId9"/>
-    <p:sldId id="264" r:id="rId10"/>
-    <p:sldId id="263" r:id="rId11"/>
-    <p:sldId id="265" r:id="rId12"/>
+    <p:sldId id="264" r:id="rId9"/>
+    <p:sldId id="263" r:id="rId10"/>
+    <p:sldId id="265" r:id="rId11"/>
   </p:sldIdLst>
   <p:sldSz cx="12192000" cy="6858000"/>
   <p:notesSz cx="6858000" cy="9144000"/>
@@ -521,107 +520,8 @@
           <a:p>
             <a:r>
               <a:rPr lang="en-GB" dirty="0"/>
-              <a:t>About robotics(history of robot manipulators and mobile robots)</a:t>
-            </a:r>
-          </a:p>
-          <a:p>
-            <a:r>
-              <a:rPr lang="en-GB" dirty="0"/>
-              <a:t>The ROS frameworks</a:t>
-            </a:r>
-          </a:p>
-          <a:p>
-            <a:r>
-              <a:rPr lang="en-GB" dirty="0"/>
-              <a:t>Why mobile robots</a:t>
-            </a:r>
-          </a:p>
-          <a:p>
-            <a:r>
-              <a:rPr lang="en-GB" dirty="0"/>
-              <a:t>Robots for educational purposes-the need for mobile robots in schools_ to showcase robotics  and inspire young people(talk also about personal reasons for choosing such a project)</a:t>
-            </a:r>
-          </a:p>
-          <a:p>
-            <a:pPr marL="0" indent="0">
-              <a:buNone/>
-            </a:pPr>
-            <a:r>
-              <a:rPr lang="en-GB" dirty="0"/>
-              <a:t>2</a:t>
-            </a:r>
-          </a:p>
-          <a:p>
-            <a:pPr marL="0" indent="0">
-              <a:buNone/>
-            </a:pPr>
-            <a:r>
-              <a:rPr lang="en-GB" dirty="0"/>
-              <a:t>Current state of the Project</a:t>
-            </a:r>
-          </a:p>
-          <a:p>
-            <a:r>
-              <a:rPr lang="en-GB" dirty="0"/>
-              <a:t>Design of the mobile robot</a:t>
-            </a:r>
-          </a:p>
-          <a:p>
-            <a:r>
-              <a:rPr lang="en-GB" dirty="0"/>
-              <a:t>Design of the robot manipulator</a:t>
-            </a:r>
-          </a:p>
-          <a:p>
-            <a:r>
-              <a:rPr lang="en-GB" dirty="0"/>
-              <a:t>Talk about circuit</a:t>
-            </a:r>
-          </a:p>
-          <a:p>
-            <a:r>
-              <a:rPr lang="en-GB" dirty="0"/>
-              <a:t>Programming</a:t>
-            </a:r>
-          </a:p>
-          <a:p>
-            <a:r>
-              <a:rPr lang="en-GB" dirty="0"/>
-              <a:t>Interface of the app</a:t>
-            </a:r>
-          </a:p>
-          <a:p>
-            <a:r>
-              <a:rPr lang="en-GB" dirty="0"/>
-              <a:t>Add motive</a:t>
-            </a:r>
-          </a:p>
-          <a:p>
-            <a:r>
-              <a:rPr lang="en-GB" dirty="0"/>
-              <a:t>Add pictures</a:t>
-            </a:r>
-          </a:p>
-          <a:p>
-            <a:r>
-              <a:rPr lang="en-GB" dirty="0"/>
-              <a:t>Less text in slides</a:t>
-            </a:r>
-          </a:p>
-          <a:p>
-            <a:r>
-              <a:rPr lang="en-GB" dirty="0"/>
-              <a:t>Security access- case for relay</a:t>
-            </a:r>
-          </a:p>
-          <a:p>
-            <a:r>
-              <a:rPr lang="en-GB" dirty="0"/>
-              <a:t>What to do next</a:t>
-            </a:r>
-          </a:p>
-          <a:p>
-            <a:endParaRPr lang="en-GB" dirty="0"/>
+              <a:t>In the first point remember to highlight how the tv series inspired you</a:t>
+            </a:r>
           </a:p>
         </p:txBody>
       </p:sp>
@@ -651,7 +551,7 @@
     </p:spTree>
     <p:extLst>
       <p:ext uri="{BB962C8B-B14F-4D97-AF65-F5344CB8AC3E}">
-        <p14:creationId xmlns:p14="http://schemas.microsoft.com/office/powerpoint/2010/main" val="403790905"/>
+        <p14:creationId xmlns:p14="http://schemas.microsoft.com/office/powerpoint/2010/main" val="1889679164"/>
       </p:ext>
     </p:extLst>
   </p:cSld>
@@ -707,7 +607,7 @@
           <a:p>
             <a:r>
               <a:rPr lang="en-GB" dirty="0"/>
-              <a:t>In the first point remember to highlight how the tv series inspired you</a:t>
+              <a:t>Reason for interfacing a manipulator with a mobile robot is to showcase how a pick and place with teleoperation where one of the degree of freedom of the manipulator is the robot itself hence have a more rounder view of the world of robotics.</a:t>
             </a:r>
           </a:p>
         </p:txBody>
@@ -738,7 +638,7 @@
     </p:spTree>
     <p:extLst>
       <p:ext uri="{BB962C8B-B14F-4D97-AF65-F5344CB8AC3E}">
-        <p14:creationId xmlns:p14="http://schemas.microsoft.com/office/powerpoint/2010/main" val="1889679164"/>
+        <p14:creationId xmlns:p14="http://schemas.microsoft.com/office/powerpoint/2010/main" val="3864393109"/>
       </p:ext>
     </p:extLst>
   </p:cSld>
@@ -794,7 +694,19 @@
           <a:p>
             <a:r>
               <a:rPr lang="en-GB" dirty="0"/>
-              <a:t>Reason for interfacing a manipulator with a mobile robot is to showcase how a pick and place with teleoperation where one of the degree of freedom of the manipulator is the robot itself hence have a more rounder view of the world of robotics.</a:t>
+              <a:t>-define what mobile robots are</a:t>
+            </a:r>
+          </a:p>
+          <a:p>
+            <a:r>
+              <a:rPr lang="en-GB" dirty="0"/>
+              <a:t>-talk through the ROS framework</a:t>
+            </a:r>
+          </a:p>
+          <a:p>
+            <a:r>
+              <a:rPr lang="en-GB" dirty="0"/>
+              <a:t>-Highlight the need of teaching robotics </a:t>
             </a:r>
           </a:p>
         </p:txBody>
@@ -825,7 +737,7 @@
     </p:spTree>
     <p:extLst>
       <p:ext uri="{BB962C8B-B14F-4D97-AF65-F5344CB8AC3E}">
-        <p14:creationId xmlns:p14="http://schemas.microsoft.com/office/powerpoint/2010/main" val="3864393109"/>
+        <p14:creationId xmlns:p14="http://schemas.microsoft.com/office/powerpoint/2010/main" val="2102018952"/>
       </p:ext>
     </p:extLst>
   </p:cSld>
@@ -881,19 +793,7 @@
           <a:p>
             <a:r>
               <a:rPr lang="en-GB" dirty="0"/>
-              <a:t>-define what mobile robots are</a:t>
-            </a:r>
-          </a:p>
-          <a:p>
-            <a:r>
-              <a:rPr lang="en-GB" dirty="0"/>
-              <a:t>-talk through the ROS framework</a:t>
-            </a:r>
-          </a:p>
-          <a:p>
-            <a:r>
-              <a:rPr lang="en-GB" dirty="0"/>
-              <a:t>-Highlight the need of teaching robotics </a:t>
+              <a:t>Emphasize on the security access, why </a:t>
             </a:r>
           </a:p>
         </p:txBody>
@@ -915,7 +815,7 @@
           <a:p>
             <a:fld id="{93BB27F3-B6CB-4810-A86B-B5C3B88244AA}" type="slidenum">
               <a:rPr lang="en-GB" smtClean="0"/>
-              <a:t>5</a:t>
+              <a:t>7</a:t>
             </a:fld>
             <a:endParaRPr lang="en-GB"/>
           </a:p>
@@ -924,7 +824,7 @@
     </p:spTree>
     <p:extLst>
       <p:ext uri="{BB962C8B-B14F-4D97-AF65-F5344CB8AC3E}">
-        <p14:creationId xmlns:p14="http://schemas.microsoft.com/office/powerpoint/2010/main" val="2102018952"/>
+        <p14:creationId xmlns:p14="http://schemas.microsoft.com/office/powerpoint/2010/main" val="2917256197"/>
       </p:ext>
     </p:extLst>
   </p:cSld>
@@ -978,6 +878,93 @@
           <a:bodyPr/>
           <a:lstStyle/>
           <a:p>
+            <a:r>
+              <a:rPr lang="en-GB" dirty="0"/>
+              <a:t>Add few pictures of the prototype</a:t>
+            </a:r>
+          </a:p>
+        </p:txBody>
+      </p:sp>
+      <p:sp>
+        <p:nvSpPr>
+          <p:cNvPr id="4" name="Slide Number Placeholder 3"/>
+          <p:cNvSpPr>
+            <a:spLocks noGrp="1"/>
+          </p:cNvSpPr>
+          <p:nvPr>
+            <p:ph type="sldNum" sz="quarter" idx="10"/>
+          </p:nvPr>
+        </p:nvSpPr>
+        <p:spPr/>
+        <p:txBody>
+          <a:bodyPr/>
+          <a:lstStyle/>
+          <a:p>
+            <a:fld id="{93BB27F3-B6CB-4810-A86B-B5C3B88244AA}" type="slidenum">
+              <a:rPr lang="en-GB" smtClean="0"/>
+              <a:t>8</a:t>
+            </a:fld>
+            <a:endParaRPr lang="en-GB"/>
+          </a:p>
+        </p:txBody>
+      </p:sp>
+    </p:spTree>
+    <p:extLst>
+      <p:ext uri="{BB962C8B-B14F-4D97-AF65-F5344CB8AC3E}">
+        <p14:creationId xmlns:p14="http://schemas.microsoft.com/office/powerpoint/2010/main" val="2015563548"/>
+      </p:ext>
+    </p:extLst>
+  </p:cSld>
+  <p:clrMapOvr>
+    <a:masterClrMapping/>
+  </p:clrMapOvr>
+</p:notes>
+</file>
+
+<file path=ppt/notesSlides/notesSlide6.xml><?xml version="1.0" encoding="utf-8"?>
+<p:notes xmlns:a="http://schemas.openxmlformats.org/drawingml/2006/main" xmlns:r="http://schemas.openxmlformats.org/officeDocument/2006/relationships" xmlns:p="http://schemas.openxmlformats.org/presentationml/2006/main">
+  <p:cSld>
+    <p:spTree>
+      <p:nvGrpSpPr>
+        <p:cNvPr id="1" name=""/>
+        <p:cNvGrpSpPr/>
+        <p:nvPr/>
+      </p:nvGrpSpPr>
+      <p:grpSpPr>
+        <a:xfrm>
+          <a:off x="0" y="0"/>
+          <a:ext cx="0" cy="0"/>
+          <a:chOff x="0" y="0"/>
+          <a:chExt cx="0" cy="0"/>
+        </a:xfrm>
+      </p:grpSpPr>
+      <p:sp>
+        <p:nvSpPr>
+          <p:cNvPr id="2" name="Slide Image Placeholder 1"/>
+          <p:cNvSpPr>
+            <a:spLocks noGrp="1" noRot="1" noChangeAspect="1"/>
+          </p:cNvSpPr>
+          <p:nvPr>
+            <p:ph type="sldImg"/>
+          </p:nvPr>
+        </p:nvSpPr>
+        <p:spPr/>
+      </p:sp>
+      <p:sp>
+        <p:nvSpPr>
+          <p:cNvPr id="3" name="Notes Placeholder 2"/>
+          <p:cNvSpPr>
+            <a:spLocks noGrp="1"/>
+          </p:cNvSpPr>
+          <p:nvPr>
+            <p:ph type="body" idx="1"/>
+          </p:nvPr>
+        </p:nvSpPr>
+        <p:spPr/>
+        <p:txBody>
+          <a:bodyPr/>
+          <a:lstStyle/>
+          <a:p>
             <a:pPr marL="0" marR="0" lvl="0" indent="0" algn="l" defTabSz="914400" rtl="0" eaLnBrk="1" fontAlgn="auto" latinLnBrk="0" hangingPunct="1">
               <a:lnSpc>
                 <a:spcPct val="100000"/>
@@ -1022,7 +1009,7 @@
           <a:p>
             <a:fld id="{93BB27F3-B6CB-4810-A86B-B5C3B88244AA}" type="slidenum">
               <a:rPr lang="en-GB" smtClean="0"/>
-              <a:t>11</a:t>
+              <a:t>10</a:t>
             </a:fld>
             <a:endParaRPr lang="en-GB"/>
           </a:p>
@@ -1063,7 +1050,7 @@
           <p:cNvPr id="2" name="Title 1">
             <a:extLst>
               <a:ext uri="{FF2B5EF4-FFF2-40B4-BE49-F238E27FC236}">
-                <a16:creationId xmlns:a16="http://schemas.microsoft.com/office/drawing/2014/main" id="{418C1411-8889-49F7-B5C2-87350C5062CC}"/>
+                <a16:creationId xmlns:a16="http://schemas.microsoft.com/office/drawing/2014/main" id="{6F1D7A25-D619-4446-AC63-20A38310638E}"/>
               </a:ext>
             </a:extLst>
           </p:cNvPr>
@@ -1101,7 +1088,7 @@
           <p:cNvPr id="3" name="Subtitle 2">
             <a:extLst>
               <a:ext uri="{FF2B5EF4-FFF2-40B4-BE49-F238E27FC236}">
-                <a16:creationId xmlns:a16="http://schemas.microsoft.com/office/drawing/2014/main" id="{E4AFB405-D3EB-418A-9C17-05689A8654FB}"/>
+                <a16:creationId xmlns:a16="http://schemas.microsoft.com/office/drawing/2014/main" id="{1C439E5B-A6F3-4EEF-BE08-AD7287603006}"/>
               </a:ext>
             </a:extLst>
           </p:cNvPr>
@@ -1172,7 +1159,7 @@
           <p:cNvPr id="4" name="Date Placeholder 3">
             <a:extLst>
               <a:ext uri="{FF2B5EF4-FFF2-40B4-BE49-F238E27FC236}">
-                <a16:creationId xmlns:a16="http://schemas.microsoft.com/office/drawing/2014/main" id="{AD80078E-FD62-49EE-A0A2-9A339695B1CB}"/>
+                <a16:creationId xmlns:a16="http://schemas.microsoft.com/office/drawing/2014/main" id="{32D6E38C-392B-4228-9B3B-212833ABFC78}"/>
               </a:ext>
             </a:extLst>
           </p:cNvPr>
@@ -1201,7 +1188,7 @@
           <p:cNvPr id="5" name="Footer Placeholder 4">
             <a:extLst>
               <a:ext uri="{FF2B5EF4-FFF2-40B4-BE49-F238E27FC236}">
-                <a16:creationId xmlns:a16="http://schemas.microsoft.com/office/drawing/2014/main" id="{AEA513E0-A1E5-4730-A6C6-96EFF97F6C64}"/>
+                <a16:creationId xmlns:a16="http://schemas.microsoft.com/office/drawing/2014/main" id="{9C651275-26A6-417F-ACC3-F947F09965B8}"/>
               </a:ext>
             </a:extLst>
           </p:cNvPr>
@@ -1226,7 +1213,7 @@
           <p:cNvPr id="6" name="Slide Number Placeholder 5">
             <a:extLst>
               <a:ext uri="{FF2B5EF4-FFF2-40B4-BE49-F238E27FC236}">
-                <a16:creationId xmlns:a16="http://schemas.microsoft.com/office/drawing/2014/main" id="{E883030F-62AE-447D-BD12-4CA3F992ACCF}"/>
+                <a16:creationId xmlns:a16="http://schemas.microsoft.com/office/drawing/2014/main" id="{3203B5E2-3438-47D1-86ED-72012FE02CD1}"/>
               </a:ext>
             </a:extLst>
           </p:cNvPr>
@@ -1253,7 +1240,7 @@
     </p:spTree>
     <p:extLst>
       <p:ext uri="{BB962C8B-B14F-4D97-AF65-F5344CB8AC3E}">
-        <p14:creationId xmlns:p14="http://schemas.microsoft.com/office/powerpoint/2010/main" val="1324900580"/>
+        <p14:creationId xmlns:p14="http://schemas.microsoft.com/office/powerpoint/2010/main" val="2820905220"/>
       </p:ext>
     </p:extLst>
   </p:cSld>
@@ -1285,7 +1272,7 @@
           <p:cNvPr id="2" name="Title 1">
             <a:extLst>
               <a:ext uri="{FF2B5EF4-FFF2-40B4-BE49-F238E27FC236}">
-                <a16:creationId xmlns:a16="http://schemas.microsoft.com/office/drawing/2014/main" id="{BBB6F5A7-E749-476B-96FB-59DCE44990AE}"/>
+                <a16:creationId xmlns:a16="http://schemas.microsoft.com/office/drawing/2014/main" id="{E6BDEAF0-B7E3-4BFE-B4CB-4F355EDD4132}"/>
               </a:ext>
             </a:extLst>
           </p:cNvPr>
@@ -1314,7 +1301,7 @@
           <p:cNvPr id="3" name="Vertical Text Placeholder 2">
             <a:extLst>
               <a:ext uri="{FF2B5EF4-FFF2-40B4-BE49-F238E27FC236}">
-                <a16:creationId xmlns:a16="http://schemas.microsoft.com/office/drawing/2014/main" id="{2490BAD4-99D9-4554-B1F8-8FB5E9171849}"/>
+                <a16:creationId xmlns:a16="http://schemas.microsoft.com/office/drawing/2014/main" id="{66C287D0-8746-4428-8B0F-AF1E6E8DCE5E}"/>
               </a:ext>
             </a:extLst>
           </p:cNvPr>
@@ -1372,7 +1359,7 @@
           <p:cNvPr id="4" name="Date Placeholder 3">
             <a:extLst>
               <a:ext uri="{FF2B5EF4-FFF2-40B4-BE49-F238E27FC236}">
-                <a16:creationId xmlns:a16="http://schemas.microsoft.com/office/drawing/2014/main" id="{55B13286-4C26-46A2-807A-2E45CB82BCD1}"/>
+                <a16:creationId xmlns:a16="http://schemas.microsoft.com/office/drawing/2014/main" id="{E1873192-6C80-4E1A-BBD7-04B2588E1C6D}"/>
               </a:ext>
             </a:extLst>
           </p:cNvPr>
@@ -1401,7 +1388,7 @@
           <p:cNvPr id="5" name="Footer Placeholder 4">
             <a:extLst>
               <a:ext uri="{FF2B5EF4-FFF2-40B4-BE49-F238E27FC236}">
-                <a16:creationId xmlns:a16="http://schemas.microsoft.com/office/drawing/2014/main" id="{6B535247-5382-4963-AEC8-DC23044DA5D5}"/>
+                <a16:creationId xmlns:a16="http://schemas.microsoft.com/office/drawing/2014/main" id="{AA72EF32-A545-4EC6-83FD-92E573E73852}"/>
               </a:ext>
             </a:extLst>
           </p:cNvPr>
@@ -1426,7 +1413,7 @@
           <p:cNvPr id="6" name="Slide Number Placeholder 5">
             <a:extLst>
               <a:ext uri="{FF2B5EF4-FFF2-40B4-BE49-F238E27FC236}">
-                <a16:creationId xmlns:a16="http://schemas.microsoft.com/office/drawing/2014/main" id="{EEF014EB-1BDB-4A56-A3AA-B593F9A91464}"/>
+                <a16:creationId xmlns:a16="http://schemas.microsoft.com/office/drawing/2014/main" id="{8361BEB9-B00E-42B5-9C4D-555FAC35A028}"/>
               </a:ext>
             </a:extLst>
           </p:cNvPr>
@@ -1453,7 +1440,7 @@
     </p:spTree>
     <p:extLst>
       <p:ext uri="{BB962C8B-B14F-4D97-AF65-F5344CB8AC3E}">
-        <p14:creationId xmlns:p14="http://schemas.microsoft.com/office/powerpoint/2010/main" val="676229029"/>
+        <p14:creationId xmlns:p14="http://schemas.microsoft.com/office/powerpoint/2010/main" val="944241040"/>
       </p:ext>
     </p:extLst>
   </p:cSld>
@@ -1485,7 +1472,7 @@
           <p:cNvPr id="2" name="Vertical Title 1">
             <a:extLst>
               <a:ext uri="{FF2B5EF4-FFF2-40B4-BE49-F238E27FC236}">
-                <a16:creationId xmlns:a16="http://schemas.microsoft.com/office/drawing/2014/main" id="{D940D86F-50EF-45B9-8819-5F78A3FDF007}"/>
+                <a16:creationId xmlns:a16="http://schemas.microsoft.com/office/drawing/2014/main" id="{724F637A-4090-4EE5-837F-220F71E010EF}"/>
               </a:ext>
             </a:extLst>
           </p:cNvPr>
@@ -1519,7 +1506,7 @@
           <p:cNvPr id="3" name="Vertical Text Placeholder 2">
             <a:extLst>
               <a:ext uri="{FF2B5EF4-FFF2-40B4-BE49-F238E27FC236}">
-                <a16:creationId xmlns:a16="http://schemas.microsoft.com/office/drawing/2014/main" id="{5536C7C7-B495-488B-AC79-501DDFAE4276}"/>
+                <a16:creationId xmlns:a16="http://schemas.microsoft.com/office/drawing/2014/main" id="{7E358975-776D-4D7D-BBA5-C872538856BA}"/>
               </a:ext>
             </a:extLst>
           </p:cNvPr>
@@ -1582,7 +1569,7 @@
           <p:cNvPr id="4" name="Date Placeholder 3">
             <a:extLst>
               <a:ext uri="{FF2B5EF4-FFF2-40B4-BE49-F238E27FC236}">
-                <a16:creationId xmlns:a16="http://schemas.microsoft.com/office/drawing/2014/main" id="{4BB2EF3A-AAF6-4B9D-BA99-E28F3F67C3CC}"/>
+                <a16:creationId xmlns:a16="http://schemas.microsoft.com/office/drawing/2014/main" id="{CAC4F40B-B06C-4CCB-8B61-2BB2E67FFC07}"/>
               </a:ext>
             </a:extLst>
           </p:cNvPr>
@@ -1611,7 +1598,7 @@
           <p:cNvPr id="5" name="Footer Placeholder 4">
             <a:extLst>
               <a:ext uri="{FF2B5EF4-FFF2-40B4-BE49-F238E27FC236}">
-                <a16:creationId xmlns:a16="http://schemas.microsoft.com/office/drawing/2014/main" id="{23F751DB-3EE3-4810-B8B8-568EC9FE6CB5}"/>
+                <a16:creationId xmlns:a16="http://schemas.microsoft.com/office/drawing/2014/main" id="{B4E2FAD2-77D9-4CEE-B449-8C8A9DE0218F}"/>
               </a:ext>
             </a:extLst>
           </p:cNvPr>
@@ -1636,7 +1623,7 @@
           <p:cNvPr id="6" name="Slide Number Placeholder 5">
             <a:extLst>
               <a:ext uri="{FF2B5EF4-FFF2-40B4-BE49-F238E27FC236}">
-                <a16:creationId xmlns:a16="http://schemas.microsoft.com/office/drawing/2014/main" id="{E9C93A5E-04D6-48B9-A38B-9F429CA46A4E}"/>
+                <a16:creationId xmlns:a16="http://schemas.microsoft.com/office/drawing/2014/main" id="{96627DFC-5498-4CFF-83F5-86AAFE6833D3}"/>
               </a:ext>
             </a:extLst>
           </p:cNvPr>
@@ -1663,7 +1650,7 @@
     </p:spTree>
     <p:extLst>
       <p:ext uri="{BB962C8B-B14F-4D97-AF65-F5344CB8AC3E}">
-        <p14:creationId xmlns:p14="http://schemas.microsoft.com/office/powerpoint/2010/main" val="456843702"/>
+        <p14:creationId xmlns:p14="http://schemas.microsoft.com/office/powerpoint/2010/main" val="2285195495"/>
       </p:ext>
     </p:extLst>
   </p:cSld>
@@ -1695,7 +1682,7 @@
           <p:cNvPr id="2" name="Title 1">
             <a:extLst>
               <a:ext uri="{FF2B5EF4-FFF2-40B4-BE49-F238E27FC236}">
-                <a16:creationId xmlns:a16="http://schemas.microsoft.com/office/drawing/2014/main" id="{B4758E60-E34C-4026-8E21-F8BE27F1891B}"/>
+                <a16:creationId xmlns:a16="http://schemas.microsoft.com/office/drawing/2014/main" id="{7960612D-E9BB-4CBD-AB60-E1829ACAF185}"/>
               </a:ext>
             </a:extLst>
           </p:cNvPr>
@@ -1724,7 +1711,7 @@
           <p:cNvPr id="3" name="Content Placeholder 2">
             <a:extLst>
               <a:ext uri="{FF2B5EF4-FFF2-40B4-BE49-F238E27FC236}">
-                <a16:creationId xmlns:a16="http://schemas.microsoft.com/office/drawing/2014/main" id="{679D773B-B880-461F-A44D-8D7A5D663E78}"/>
+                <a16:creationId xmlns:a16="http://schemas.microsoft.com/office/drawing/2014/main" id="{4397F9C2-DA21-48A0-AE19-401D34B6CE73}"/>
               </a:ext>
             </a:extLst>
           </p:cNvPr>
@@ -1782,7 +1769,7 @@
           <p:cNvPr id="4" name="Date Placeholder 3">
             <a:extLst>
               <a:ext uri="{FF2B5EF4-FFF2-40B4-BE49-F238E27FC236}">
-                <a16:creationId xmlns:a16="http://schemas.microsoft.com/office/drawing/2014/main" id="{366E223A-2272-4334-ABC1-021967FB4634}"/>
+                <a16:creationId xmlns:a16="http://schemas.microsoft.com/office/drawing/2014/main" id="{C74B8B3B-0690-46D0-9FD1-AF8621CF4BFD}"/>
               </a:ext>
             </a:extLst>
           </p:cNvPr>
@@ -1811,7 +1798,7 @@
           <p:cNvPr id="5" name="Footer Placeholder 4">
             <a:extLst>
               <a:ext uri="{FF2B5EF4-FFF2-40B4-BE49-F238E27FC236}">
-                <a16:creationId xmlns:a16="http://schemas.microsoft.com/office/drawing/2014/main" id="{2E05065F-A33E-42BF-A230-D389ED58618D}"/>
+                <a16:creationId xmlns:a16="http://schemas.microsoft.com/office/drawing/2014/main" id="{845E608A-D321-4783-B762-9CFE27615EF0}"/>
               </a:ext>
             </a:extLst>
           </p:cNvPr>
@@ -1836,7 +1823,7 @@
           <p:cNvPr id="6" name="Slide Number Placeholder 5">
             <a:extLst>
               <a:ext uri="{FF2B5EF4-FFF2-40B4-BE49-F238E27FC236}">
-                <a16:creationId xmlns:a16="http://schemas.microsoft.com/office/drawing/2014/main" id="{2639DBCA-4870-4633-A74F-FA0B4071D0A5}"/>
+                <a16:creationId xmlns:a16="http://schemas.microsoft.com/office/drawing/2014/main" id="{A6B5A4C6-5604-4ECE-B42C-6BEDF42492F4}"/>
               </a:ext>
             </a:extLst>
           </p:cNvPr>
@@ -1863,7 +1850,7 @@
     </p:spTree>
     <p:extLst>
       <p:ext uri="{BB962C8B-B14F-4D97-AF65-F5344CB8AC3E}">
-        <p14:creationId xmlns:p14="http://schemas.microsoft.com/office/powerpoint/2010/main" val="166318441"/>
+        <p14:creationId xmlns:p14="http://schemas.microsoft.com/office/powerpoint/2010/main" val="1268478670"/>
       </p:ext>
     </p:extLst>
   </p:cSld>
@@ -1895,7 +1882,7 @@
           <p:cNvPr id="2" name="Title 1">
             <a:extLst>
               <a:ext uri="{FF2B5EF4-FFF2-40B4-BE49-F238E27FC236}">
-                <a16:creationId xmlns:a16="http://schemas.microsoft.com/office/drawing/2014/main" id="{A9F9CC50-4935-4615-A9E6-5AF193B084B3}"/>
+                <a16:creationId xmlns:a16="http://schemas.microsoft.com/office/drawing/2014/main" id="{C4FE856B-8698-47DC-AD46-EBCD11ED1F5E}"/>
               </a:ext>
             </a:extLst>
           </p:cNvPr>
@@ -1933,7 +1920,7 @@
           <p:cNvPr id="3" name="Text Placeholder 2">
             <a:extLst>
               <a:ext uri="{FF2B5EF4-FFF2-40B4-BE49-F238E27FC236}">
-                <a16:creationId xmlns:a16="http://schemas.microsoft.com/office/drawing/2014/main" id="{B708E4E6-2C37-4D71-AE20-34EB0BBAA781}"/>
+                <a16:creationId xmlns:a16="http://schemas.microsoft.com/office/drawing/2014/main" id="{83616293-F98D-4209-A008-A50F0774AF4E}"/>
               </a:ext>
             </a:extLst>
           </p:cNvPr>
@@ -2058,7 +2045,7 @@
           <p:cNvPr id="4" name="Date Placeholder 3">
             <a:extLst>
               <a:ext uri="{FF2B5EF4-FFF2-40B4-BE49-F238E27FC236}">
-                <a16:creationId xmlns:a16="http://schemas.microsoft.com/office/drawing/2014/main" id="{B079A217-0699-4513-9F4A-E0A01E929B7E}"/>
+                <a16:creationId xmlns:a16="http://schemas.microsoft.com/office/drawing/2014/main" id="{57D603B4-998A-49D1-A7B2-AC817E892A41}"/>
               </a:ext>
             </a:extLst>
           </p:cNvPr>
@@ -2087,7 +2074,7 @@
           <p:cNvPr id="5" name="Footer Placeholder 4">
             <a:extLst>
               <a:ext uri="{FF2B5EF4-FFF2-40B4-BE49-F238E27FC236}">
-                <a16:creationId xmlns:a16="http://schemas.microsoft.com/office/drawing/2014/main" id="{E6506C44-9FE7-4616-9976-79BE063D7472}"/>
+                <a16:creationId xmlns:a16="http://schemas.microsoft.com/office/drawing/2014/main" id="{55CF9DC6-929F-4888-8FC2-3124855116BC}"/>
               </a:ext>
             </a:extLst>
           </p:cNvPr>
@@ -2112,7 +2099,7 @@
           <p:cNvPr id="6" name="Slide Number Placeholder 5">
             <a:extLst>
               <a:ext uri="{FF2B5EF4-FFF2-40B4-BE49-F238E27FC236}">
-                <a16:creationId xmlns:a16="http://schemas.microsoft.com/office/drawing/2014/main" id="{8E6FE0FE-F3A7-4DA5-8E60-667B7AE19F50}"/>
+                <a16:creationId xmlns:a16="http://schemas.microsoft.com/office/drawing/2014/main" id="{5A9849B9-6651-44C4-AC74-54AAD27FA5D4}"/>
               </a:ext>
             </a:extLst>
           </p:cNvPr>
@@ -2139,7 +2126,7 @@
     </p:spTree>
     <p:extLst>
       <p:ext uri="{BB962C8B-B14F-4D97-AF65-F5344CB8AC3E}">
-        <p14:creationId xmlns:p14="http://schemas.microsoft.com/office/powerpoint/2010/main" val="1062521500"/>
+        <p14:creationId xmlns:p14="http://schemas.microsoft.com/office/powerpoint/2010/main" val="1967125926"/>
       </p:ext>
     </p:extLst>
   </p:cSld>
@@ -2171,7 +2158,7 @@
           <p:cNvPr id="2" name="Title 1">
             <a:extLst>
               <a:ext uri="{FF2B5EF4-FFF2-40B4-BE49-F238E27FC236}">
-                <a16:creationId xmlns:a16="http://schemas.microsoft.com/office/drawing/2014/main" id="{E04E2929-70A1-4EED-B3C1-F6ED9FC18D1F}"/>
+                <a16:creationId xmlns:a16="http://schemas.microsoft.com/office/drawing/2014/main" id="{EA7A426E-653B-4522-A8E6-EC80D2357F1A}"/>
               </a:ext>
             </a:extLst>
           </p:cNvPr>
@@ -2200,7 +2187,7 @@
           <p:cNvPr id="3" name="Content Placeholder 2">
             <a:extLst>
               <a:ext uri="{FF2B5EF4-FFF2-40B4-BE49-F238E27FC236}">
-                <a16:creationId xmlns:a16="http://schemas.microsoft.com/office/drawing/2014/main" id="{6B2272C6-6300-4D46-A560-98656DD39580}"/>
+                <a16:creationId xmlns:a16="http://schemas.microsoft.com/office/drawing/2014/main" id="{F5EBBD12-E7BB-4757-BA86-E0478A2319CD}"/>
               </a:ext>
             </a:extLst>
           </p:cNvPr>
@@ -2263,7 +2250,7 @@
           <p:cNvPr id="4" name="Content Placeholder 3">
             <a:extLst>
               <a:ext uri="{FF2B5EF4-FFF2-40B4-BE49-F238E27FC236}">
-                <a16:creationId xmlns:a16="http://schemas.microsoft.com/office/drawing/2014/main" id="{68655480-7C73-4B8E-A329-B5ECF838E811}"/>
+                <a16:creationId xmlns:a16="http://schemas.microsoft.com/office/drawing/2014/main" id="{A19A4F95-4771-48C6-A195-D5AC11DD2A24}"/>
               </a:ext>
             </a:extLst>
           </p:cNvPr>
@@ -2326,7 +2313,7 @@
           <p:cNvPr id="5" name="Date Placeholder 4">
             <a:extLst>
               <a:ext uri="{FF2B5EF4-FFF2-40B4-BE49-F238E27FC236}">
-                <a16:creationId xmlns:a16="http://schemas.microsoft.com/office/drawing/2014/main" id="{F35B3AA2-F221-4C6E-B792-7E9898ADCC07}"/>
+                <a16:creationId xmlns:a16="http://schemas.microsoft.com/office/drawing/2014/main" id="{B98D35D4-97ED-40B5-A45C-5A16656ED85B}"/>
               </a:ext>
             </a:extLst>
           </p:cNvPr>
@@ -2355,7 +2342,7 @@
           <p:cNvPr id="6" name="Footer Placeholder 5">
             <a:extLst>
               <a:ext uri="{FF2B5EF4-FFF2-40B4-BE49-F238E27FC236}">
-                <a16:creationId xmlns:a16="http://schemas.microsoft.com/office/drawing/2014/main" id="{6BD6F92B-3562-4AB6-98DE-CDCFD8C149BF}"/>
+                <a16:creationId xmlns:a16="http://schemas.microsoft.com/office/drawing/2014/main" id="{8A75D4F7-7186-4D84-8A73-0CF8D555D2D3}"/>
               </a:ext>
             </a:extLst>
           </p:cNvPr>
@@ -2380,7 +2367,7 @@
           <p:cNvPr id="7" name="Slide Number Placeholder 6">
             <a:extLst>
               <a:ext uri="{FF2B5EF4-FFF2-40B4-BE49-F238E27FC236}">
-                <a16:creationId xmlns:a16="http://schemas.microsoft.com/office/drawing/2014/main" id="{9B019CFE-1FA9-428F-95AE-78378CFA3F01}"/>
+                <a16:creationId xmlns:a16="http://schemas.microsoft.com/office/drawing/2014/main" id="{09C56854-969A-4CC2-AC96-CC7787B599A2}"/>
               </a:ext>
             </a:extLst>
           </p:cNvPr>
@@ -2407,7 +2394,7 @@
     </p:spTree>
     <p:extLst>
       <p:ext uri="{BB962C8B-B14F-4D97-AF65-F5344CB8AC3E}">
-        <p14:creationId xmlns:p14="http://schemas.microsoft.com/office/powerpoint/2010/main" val="433432244"/>
+        <p14:creationId xmlns:p14="http://schemas.microsoft.com/office/powerpoint/2010/main" val="934350941"/>
       </p:ext>
     </p:extLst>
   </p:cSld>
@@ -2439,7 +2426,7 @@
           <p:cNvPr id="2" name="Title 1">
             <a:extLst>
               <a:ext uri="{FF2B5EF4-FFF2-40B4-BE49-F238E27FC236}">
-                <a16:creationId xmlns:a16="http://schemas.microsoft.com/office/drawing/2014/main" id="{FF906A79-2984-43B3-BB3D-C5E4662EAA10}"/>
+                <a16:creationId xmlns:a16="http://schemas.microsoft.com/office/drawing/2014/main" id="{2D36A5F5-73E8-485B-9BBA-634343A594EA}"/>
               </a:ext>
             </a:extLst>
           </p:cNvPr>
@@ -2473,7 +2460,7 @@
           <p:cNvPr id="3" name="Text Placeholder 2">
             <a:extLst>
               <a:ext uri="{FF2B5EF4-FFF2-40B4-BE49-F238E27FC236}">
-                <a16:creationId xmlns:a16="http://schemas.microsoft.com/office/drawing/2014/main" id="{D0D1CC6B-0D4D-408A-B12D-58136CC879AC}"/>
+                <a16:creationId xmlns:a16="http://schemas.microsoft.com/office/drawing/2014/main" id="{AAEE2044-EB4F-4023-B1B8-C82FBCBCF519}"/>
               </a:ext>
             </a:extLst>
           </p:cNvPr>
@@ -2544,7 +2531,7 @@
           <p:cNvPr id="4" name="Content Placeholder 3">
             <a:extLst>
               <a:ext uri="{FF2B5EF4-FFF2-40B4-BE49-F238E27FC236}">
-                <a16:creationId xmlns:a16="http://schemas.microsoft.com/office/drawing/2014/main" id="{6100EC77-D53D-42D6-96CD-6E8F359366C2}"/>
+                <a16:creationId xmlns:a16="http://schemas.microsoft.com/office/drawing/2014/main" id="{652450E6-5B89-46AC-A52A-02C98432E97B}"/>
               </a:ext>
             </a:extLst>
           </p:cNvPr>
@@ -2607,7 +2594,7 @@
           <p:cNvPr id="5" name="Text Placeholder 4">
             <a:extLst>
               <a:ext uri="{FF2B5EF4-FFF2-40B4-BE49-F238E27FC236}">
-                <a16:creationId xmlns:a16="http://schemas.microsoft.com/office/drawing/2014/main" id="{1BA36ADF-C3DA-4BFE-BB47-D3307EC1FBA6}"/>
+                <a16:creationId xmlns:a16="http://schemas.microsoft.com/office/drawing/2014/main" id="{180F034B-8FC7-46E1-A246-369CE5449569}"/>
               </a:ext>
             </a:extLst>
           </p:cNvPr>
@@ -2678,7 +2665,7 @@
           <p:cNvPr id="6" name="Content Placeholder 5">
             <a:extLst>
               <a:ext uri="{FF2B5EF4-FFF2-40B4-BE49-F238E27FC236}">
-                <a16:creationId xmlns:a16="http://schemas.microsoft.com/office/drawing/2014/main" id="{2F31DD5D-D6AD-4CA5-8B86-E661988B8E87}"/>
+                <a16:creationId xmlns:a16="http://schemas.microsoft.com/office/drawing/2014/main" id="{75A95331-E4BC-4A89-BDF8-FBD3D56B7A2D}"/>
               </a:ext>
             </a:extLst>
           </p:cNvPr>
@@ -2741,7 +2728,7 @@
           <p:cNvPr id="7" name="Date Placeholder 6">
             <a:extLst>
               <a:ext uri="{FF2B5EF4-FFF2-40B4-BE49-F238E27FC236}">
-                <a16:creationId xmlns:a16="http://schemas.microsoft.com/office/drawing/2014/main" id="{34B2649A-5EA5-415F-A907-032014EB2DD2}"/>
+                <a16:creationId xmlns:a16="http://schemas.microsoft.com/office/drawing/2014/main" id="{C0DFA77E-6E0F-42FF-A15F-B28CA27510FB}"/>
               </a:ext>
             </a:extLst>
           </p:cNvPr>
@@ -2770,7 +2757,7 @@
           <p:cNvPr id="8" name="Footer Placeholder 7">
             <a:extLst>
               <a:ext uri="{FF2B5EF4-FFF2-40B4-BE49-F238E27FC236}">
-                <a16:creationId xmlns:a16="http://schemas.microsoft.com/office/drawing/2014/main" id="{54B525D2-0206-4676-BFC9-350936787A54}"/>
+                <a16:creationId xmlns:a16="http://schemas.microsoft.com/office/drawing/2014/main" id="{AF0D5405-5459-472C-A280-D2DCB6A11D68}"/>
               </a:ext>
             </a:extLst>
           </p:cNvPr>
@@ -2795,7 +2782,7 @@
           <p:cNvPr id="9" name="Slide Number Placeholder 8">
             <a:extLst>
               <a:ext uri="{FF2B5EF4-FFF2-40B4-BE49-F238E27FC236}">
-                <a16:creationId xmlns:a16="http://schemas.microsoft.com/office/drawing/2014/main" id="{A88748CC-D8F0-4C39-A520-A16F893300F2}"/>
+                <a16:creationId xmlns:a16="http://schemas.microsoft.com/office/drawing/2014/main" id="{F5436DF5-43D9-4A3E-98F5-0C070994E89A}"/>
               </a:ext>
             </a:extLst>
           </p:cNvPr>
@@ -2822,7 +2809,7 @@
     </p:spTree>
     <p:extLst>
       <p:ext uri="{BB962C8B-B14F-4D97-AF65-F5344CB8AC3E}">
-        <p14:creationId xmlns:p14="http://schemas.microsoft.com/office/powerpoint/2010/main" val="3353669797"/>
+        <p14:creationId xmlns:p14="http://schemas.microsoft.com/office/powerpoint/2010/main" val="1027286386"/>
       </p:ext>
     </p:extLst>
   </p:cSld>
@@ -2854,7 +2841,7 @@
           <p:cNvPr id="2" name="Title 1">
             <a:extLst>
               <a:ext uri="{FF2B5EF4-FFF2-40B4-BE49-F238E27FC236}">
-                <a16:creationId xmlns:a16="http://schemas.microsoft.com/office/drawing/2014/main" id="{55D4D251-EE72-47E2-AC52-E66697EDD8D1}"/>
+                <a16:creationId xmlns:a16="http://schemas.microsoft.com/office/drawing/2014/main" id="{06B6BB78-CA50-499C-9E6A-E2B93C604219}"/>
               </a:ext>
             </a:extLst>
           </p:cNvPr>
@@ -2883,7 +2870,7 @@
           <p:cNvPr id="3" name="Date Placeholder 2">
             <a:extLst>
               <a:ext uri="{FF2B5EF4-FFF2-40B4-BE49-F238E27FC236}">
-                <a16:creationId xmlns:a16="http://schemas.microsoft.com/office/drawing/2014/main" id="{880BB128-FF12-473A-8F43-5ECE023F47C1}"/>
+                <a16:creationId xmlns:a16="http://schemas.microsoft.com/office/drawing/2014/main" id="{FD394CE3-50FB-493D-9BE6-13DC7823A38E}"/>
               </a:ext>
             </a:extLst>
           </p:cNvPr>
@@ -2912,7 +2899,7 @@
           <p:cNvPr id="4" name="Footer Placeholder 3">
             <a:extLst>
               <a:ext uri="{FF2B5EF4-FFF2-40B4-BE49-F238E27FC236}">
-                <a16:creationId xmlns:a16="http://schemas.microsoft.com/office/drawing/2014/main" id="{B9D86C96-1625-4E29-BC3D-5601168450EB}"/>
+                <a16:creationId xmlns:a16="http://schemas.microsoft.com/office/drawing/2014/main" id="{96D1A09D-4F4A-461C-B04A-96CD536E0AF5}"/>
               </a:ext>
             </a:extLst>
           </p:cNvPr>
@@ -2937,7 +2924,7 @@
           <p:cNvPr id="5" name="Slide Number Placeholder 4">
             <a:extLst>
               <a:ext uri="{FF2B5EF4-FFF2-40B4-BE49-F238E27FC236}">
-                <a16:creationId xmlns:a16="http://schemas.microsoft.com/office/drawing/2014/main" id="{06404FDE-23B2-465B-823E-0D852FFD071A}"/>
+                <a16:creationId xmlns:a16="http://schemas.microsoft.com/office/drawing/2014/main" id="{44F5721A-6BAC-4E0F-9646-BFA60D603BDC}"/>
               </a:ext>
             </a:extLst>
           </p:cNvPr>
@@ -2964,7 +2951,7 @@
     </p:spTree>
     <p:extLst>
       <p:ext uri="{BB962C8B-B14F-4D97-AF65-F5344CB8AC3E}">
-        <p14:creationId xmlns:p14="http://schemas.microsoft.com/office/powerpoint/2010/main" val="1469020826"/>
+        <p14:creationId xmlns:p14="http://schemas.microsoft.com/office/powerpoint/2010/main" val="2898082069"/>
       </p:ext>
     </p:extLst>
   </p:cSld>
@@ -2996,7 +2983,7 @@
           <p:cNvPr id="2" name="Date Placeholder 1">
             <a:extLst>
               <a:ext uri="{FF2B5EF4-FFF2-40B4-BE49-F238E27FC236}">
-                <a16:creationId xmlns:a16="http://schemas.microsoft.com/office/drawing/2014/main" id="{3B0032C0-5E5C-4BF8-9E76-ADB39D3E2CFA}"/>
+                <a16:creationId xmlns:a16="http://schemas.microsoft.com/office/drawing/2014/main" id="{1F2D6F37-B7D3-44F9-A239-735F62B7820E}"/>
               </a:ext>
             </a:extLst>
           </p:cNvPr>
@@ -3025,7 +3012,7 @@
           <p:cNvPr id="3" name="Footer Placeholder 2">
             <a:extLst>
               <a:ext uri="{FF2B5EF4-FFF2-40B4-BE49-F238E27FC236}">
-                <a16:creationId xmlns:a16="http://schemas.microsoft.com/office/drawing/2014/main" id="{FDFEC465-E6D7-4717-971F-B564625D8736}"/>
+                <a16:creationId xmlns:a16="http://schemas.microsoft.com/office/drawing/2014/main" id="{BB70EE1C-330A-4316-B774-25CD74D87D2F}"/>
               </a:ext>
             </a:extLst>
           </p:cNvPr>
@@ -3050,7 +3037,7 @@
           <p:cNvPr id="4" name="Slide Number Placeholder 3">
             <a:extLst>
               <a:ext uri="{FF2B5EF4-FFF2-40B4-BE49-F238E27FC236}">
-                <a16:creationId xmlns:a16="http://schemas.microsoft.com/office/drawing/2014/main" id="{E0F0775E-3282-484D-956D-316AC5BA542F}"/>
+                <a16:creationId xmlns:a16="http://schemas.microsoft.com/office/drawing/2014/main" id="{3A40BA8D-6442-4B2E-9B75-A2A96B3EDD32}"/>
               </a:ext>
             </a:extLst>
           </p:cNvPr>
@@ -3077,7 +3064,7 @@
     </p:spTree>
     <p:extLst>
       <p:ext uri="{BB962C8B-B14F-4D97-AF65-F5344CB8AC3E}">
-        <p14:creationId xmlns:p14="http://schemas.microsoft.com/office/powerpoint/2010/main" val="437086536"/>
+        <p14:creationId xmlns:p14="http://schemas.microsoft.com/office/powerpoint/2010/main" val="4240967738"/>
       </p:ext>
     </p:extLst>
   </p:cSld>
@@ -3109,7 +3096,7 @@
           <p:cNvPr id="2" name="Title 1">
             <a:extLst>
               <a:ext uri="{FF2B5EF4-FFF2-40B4-BE49-F238E27FC236}">
-                <a16:creationId xmlns:a16="http://schemas.microsoft.com/office/drawing/2014/main" id="{88C90D09-92DC-47D8-97F1-CA1E8742E259}"/>
+                <a16:creationId xmlns:a16="http://schemas.microsoft.com/office/drawing/2014/main" id="{CA02D775-2171-44C0-A0D2-B1CAE46F4BF8}"/>
               </a:ext>
             </a:extLst>
           </p:cNvPr>
@@ -3147,7 +3134,7 @@
           <p:cNvPr id="3" name="Content Placeholder 2">
             <a:extLst>
               <a:ext uri="{FF2B5EF4-FFF2-40B4-BE49-F238E27FC236}">
-                <a16:creationId xmlns:a16="http://schemas.microsoft.com/office/drawing/2014/main" id="{2C698BD5-30EA-4FC1-8AAA-7FEA24458972}"/>
+                <a16:creationId xmlns:a16="http://schemas.microsoft.com/office/drawing/2014/main" id="{A566792C-B7C0-4DA6-9909-AE8719D0DF14}"/>
               </a:ext>
             </a:extLst>
           </p:cNvPr>
@@ -3238,7 +3225,7 @@
           <p:cNvPr id="4" name="Text Placeholder 3">
             <a:extLst>
               <a:ext uri="{FF2B5EF4-FFF2-40B4-BE49-F238E27FC236}">
-                <a16:creationId xmlns:a16="http://schemas.microsoft.com/office/drawing/2014/main" id="{0488CA4D-23EF-4389-AA0A-64627051860A}"/>
+                <a16:creationId xmlns:a16="http://schemas.microsoft.com/office/drawing/2014/main" id="{E27DBB69-8F44-408F-9B78-85DE8B1A807C}"/>
               </a:ext>
             </a:extLst>
           </p:cNvPr>
@@ -3309,7 +3296,7 @@
           <p:cNvPr id="5" name="Date Placeholder 4">
             <a:extLst>
               <a:ext uri="{FF2B5EF4-FFF2-40B4-BE49-F238E27FC236}">
-                <a16:creationId xmlns:a16="http://schemas.microsoft.com/office/drawing/2014/main" id="{DBA6CE6D-2B8D-461A-B303-709245E0D86A}"/>
+                <a16:creationId xmlns:a16="http://schemas.microsoft.com/office/drawing/2014/main" id="{B46896C7-19D7-45B4-B00E-7337322E6982}"/>
               </a:ext>
             </a:extLst>
           </p:cNvPr>
@@ -3338,7 +3325,7 @@
           <p:cNvPr id="6" name="Footer Placeholder 5">
             <a:extLst>
               <a:ext uri="{FF2B5EF4-FFF2-40B4-BE49-F238E27FC236}">
-                <a16:creationId xmlns:a16="http://schemas.microsoft.com/office/drawing/2014/main" id="{4ACB1D87-0E02-484E-8C2C-097AAE013CF8}"/>
+                <a16:creationId xmlns:a16="http://schemas.microsoft.com/office/drawing/2014/main" id="{1D14FBF2-0309-4644-B120-4CDEB5714FF1}"/>
               </a:ext>
             </a:extLst>
           </p:cNvPr>
@@ -3363,7 +3350,7 @@
           <p:cNvPr id="7" name="Slide Number Placeholder 6">
             <a:extLst>
               <a:ext uri="{FF2B5EF4-FFF2-40B4-BE49-F238E27FC236}">
-                <a16:creationId xmlns:a16="http://schemas.microsoft.com/office/drawing/2014/main" id="{C0675907-B912-46F1-8799-48502A79404C}"/>
+                <a16:creationId xmlns:a16="http://schemas.microsoft.com/office/drawing/2014/main" id="{A24CE33C-8EF1-4A73-A816-BEEDCDEBCF86}"/>
               </a:ext>
             </a:extLst>
           </p:cNvPr>
@@ -3390,7 +3377,7 @@
     </p:spTree>
     <p:extLst>
       <p:ext uri="{BB962C8B-B14F-4D97-AF65-F5344CB8AC3E}">
-        <p14:creationId xmlns:p14="http://schemas.microsoft.com/office/powerpoint/2010/main" val="1140907705"/>
+        <p14:creationId xmlns:p14="http://schemas.microsoft.com/office/powerpoint/2010/main" val="2855089062"/>
       </p:ext>
     </p:extLst>
   </p:cSld>
@@ -3422,7 +3409,7 @@
           <p:cNvPr id="2" name="Title 1">
             <a:extLst>
               <a:ext uri="{FF2B5EF4-FFF2-40B4-BE49-F238E27FC236}">
-                <a16:creationId xmlns:a16="http://schemas.microsoft.com/office/drawing/2014/main" id="{29C98586-3AB0-4544-9BD1-A7D35C445940}"/>
+                <a16:creationId xmlns:a16="http://schemas.microsoft.com/office/drawing/2014/main" id="{DBE90C9A-D658-48B1-B01F-B6EB0676B898}"/>
               </a:ext>
             </a:extLst>
           </p:cNvPr>
@@ -3460,7 +3447,7 @@
           <p:cNvPr id="3" name="Picture Placeholder 2">
             <a:extLst>
               <a:ext uri="{FF2B5EF4-FFF2-40B4-BE49-F238E27FC236}">
-                <a16:creationId xmlns:a16="http://schemas.microsoft.com/office/drawing/2014/main" id="{84E288EB-3652-4F59-A8BF-B6EC72300D17}"/>
+                <a16:creationId xmlns:a16="http://schemas.microsoft.com/office/drawing/2014/main" id="{776B5AA0-223C-4336-8250-E2EE4E1E0090}"/>
               </a:ext>
             </a:extLst>
           </p:cNvPr>
@@ -3527,7 +3514,7 @@
           <p:cNvPr id="4" name="Text Placeholder 3">
             <a:extLst>
               <a:ext uri="{FF2B5EF4-FFF2-40B4-BE49-F238E27FC236}">
-                <a16:creationId xmlns:a16="http://schemas.microsoft.com/office/drawing/2014/main" id="{BCF25D8C-DEC6-4B81-94FE-0F311EAFA53C}"/>
+                <a16:creationId xmlns:a16="http://schemas.microsoft.com/office/drawing/2014/main" id="{2C8F9F5C-7028-4567-9345-274EEC1D8282}"/>
               </a:ext>
             </a:extLst>
           </p:cNvPr>
@@ -3598,7 +3585,7 @@
           <p:cNvPr id="5" name="Date Placeholder 4">
             <a:extLst>
               <a:ext uri="{FF2B5EF4-FFF2-40B4-BE49-F238E27FC236}">
-                <a16:creationId xmlns:a16="http://schemas.microsoft.com/office/drawing/2014/main" id="{4A5A8C26-05E8-401D-9028-0C6E42AD117D}"/>
+                <a16:creationId xmlns:a16="http://schemas.microsoft.com/office/drawing/2014/main" id="{53AC92F9-87A5-4D0C-826C-7A6B2D05C876}"/>
               </a:ext>
             </a:extLst>
           </p:cNvPr>
@@ -3627,7 +3614,7 @@
           <p:cNvPr id="6" name="Footer Placeholder 5">
             <a:extLst>
               <a:ext uri="{FF2B5EF4-FFF2-40B4-BE49-F238E27FC236}">
-                <a16:creationId xmlns:a16="http://schemas.microsoft.com/office/drawing/2014/main" id="{BF6AF137-7996-4EC5-B457-87C53ADA46B0}"/>
+                <a16:creationId xmlns:a16="http://schemas.microsoft.com/office/drawing/2014/main" id="{F2E8FD7F-3106-40BD-AE9D-25459D4A8F88}"/>
               </a:ext>
             </a:extLst>
           </p:cNvPr>
@@ -3643,7 +3630,7 @@
           <a:bodyPr/>
           <a:lstStyle/>
           <a:p>
-            <a:endParaRPr lang="en-GB"/>
+            <a:endParaRPr lang="en-US" dirty="0"/>
           </a:p>
         </p:txBody>
       </p:sp>
@@ -3652,7 +3639,7 @@
           <p:cNvPr id="7" name="Slide Number Placeholder 6">
             <a:extLst>
               <a:ext uri="{FF2B5EF4-FFF2-40B4-BE49-F238E27FC236}">
-                <a16:creationId xmlns:a16="http://schemas.microsoft.com/office/drawing/2014/main" id="{81F40AEE-C727-4358-8EBB-D3560B02A3EE}"/>
+                <a16:creationId xmlns:a16="http://schemas.microsoft.com/office/drawing/2014/main" id="{6C61E6D1-BF0F-46BA-9F95-1A9992B0206C}"/>
               </a:ext>
             </a:extLst>
           </p:cNvPr>
@@ -3679,7 +3666,7 @@
     </p:spTree>
     <p:extLst>
       <p:ext uri="{BB962C8B-B14F-4D97-AF65-F5344CB8AC3E}">
-        <p14:creationId xmlns:p14="http://schemas.microsoft.com/office/powerpoint/2010/main" val="908400375"/>
+        <p14:creationId xmlns:p14="http://schemas.microsoft.com/office/powerpoint/2010/main" val="469097854"/>
       </p:ext>
     </p:extLst>
   </p:cSld>
@@ -3716,7 +3703,7 @@
           <p:cNvPr id="2" name="Title Placeholder 1">
             <a:extLst>
               <a:ext uri="{FF2B5EF4-FFF2-40B4-BE49-F238E27FC236}">
-                <a16:creationId xmlns:a16="http://schemas.microsoft.com/office/drawing/2014/main" id="{D6170754-E2A3-4E29-813C-F6FE91497368}"/>
+                <a16:creationId xmlns:a16="http://schemas.microsoft.com/office/drawing/2014/main" id="{4C98E5F0-B380-4330-B28E-76949B5C39DD}"/>
               </a:ext>
             </a:extLst>
           </p:cNvPr>
@@ -3755,7 +3742,7 @@
           <p:cNvPr id="3" name="Text Placeholder 2">
             <a:extLst>
               <a:ext uri="{FF2B5EF4-FFF2-40B4-BE49-F238E27FC236}">
-                <a16:creationId xmlns:a16="http://schemas.microsoft.com/office/drawing/2014/main" id="{47B2BD31-F49B-4486-A518-AC763C0C3CEE}"/>
+                <a16:creationId xmlns:a16="http://schemas.microsoft.com/office/drawing/2014/main" id="{4CD38CF6-003C-4C09-B095-81AEFBA5BB2C}"/>
               </a:ext>
             </a:extLst>
           </p:cNvPr>
@@ -3823,7 +3810,7 @@
           <p:cNvPr id="4" name="Date Placeholder 3">
             <a:extLst>
               <a:ext uri="{FF2B5EF4-FFF2-40B4-BE49-F238E27FC236}">
-                <a16:creationId xmlns:a16="http://schemas.microsoft.com/office/drawing/2014/main" id="{638448DE-5B77-46C1-ABCE-2EC1CDE10DB2}"/>
+                <a16:creationId xmlns:a16="http://schemas.microsoft.com/office/drawing/2014/main" id="{90E9527C-2F17-437E-A6ED-377E7478441E}"/>
               </a:ext>
             </a:extLst>
           </p:cNvPr>
@@ -3870,7 +3857,7 @@
           <p:cNvPr id="5" name="Footer Placeholder 4">
             <a:extLst>
               <a:ext uri="{FF2B5EF4-FFF2-40B4-BE49-F238E27FC236}">
-                <a16:creationId xmlns:a16="http://schemas.microsoft.com/office/drawing/2014/main" id="{183B1F81-5F30-41AE-A6E7-082CFC15538F}"/>
+                <a16:creationId xmlns:a16="http://schemas.microsoft.com/office/drawing/2014/main" id="{9A7E9864-D4E1-4409-BC62-F06DE873899D}"/>
               </a:ext>
             </a:extLst>
           </p:cNvPr>
@@ -3913,7 +3900,7 @@
           <p:cNvPr id="6" name="Slide Number Placeholder 5">
             <a:extLst>
               <a:ext uri="{FF2B5EF4-FFF2-40B4-BE49-F238E27FC236}">
-                <a16:creationId xmlns:a16="http://schemas.microsoft.com/office/drawing/2014/main" id="{E6E77F8B-D2CF-4F39-8B1C-DD75D5ABD35A}"/>
+                <a16:creationId xmlns:a16="http://schemas.microsoft.com/office/drawing/2014/main" id="{BB28D101-CE49-4AE7-AC7C-FD16CF917996}"/>
               </a:ext>
             </a:extLst>
           </p:cNvPr>
@@ -3958,23 +3945,23 @@
     </p:spTree>
     <p:extLst>
       <p:ext uri="{BB962C8B-B14F-4D97-AF65-F5344CB8AC3E}">
-        <p14:creationId xmlns:p14="http://schemas.microsoft.com/office/powerpoint/2010/main" val="2468999964"/>
+        <p14:creationId xmlns:p14="http://schemas.microsoft.com/office/powerpoint/2010/main" val="806254644"/>
       </p:ext>
     </p:extLst>
   </p:cSld>
   <p:clrMap bg1="lt1" tx1="dk1" bg2="lt2" tx2="dk2" accent1="accent1" accent2="accent2" accent3="accent3" accent4="accent4" accent5="accent5" accent6="accent6" hlink="hlink" folHlink="folHlink"/>
   <p:sldLayoutIdLst>
-    <p:sldLayoutId id="2147483730" r:id="rId1"/>
-    <p:sldLayoutId id="2147483731" r:id="rId2"/>
-    <p:sldLayoutId id="2147483732" r:id="rId3"/>
-    <p:sldLayoutId id="2147483733" r:id="rId4"/>
-    <p:sldLayoutId id="2147483734" r:id="rId5"/>
-    <p:sldLayoutId id="2147483735" r:id="rId6"/>
-    <p:sldLayoutId id="2147483736" r:id="rId7"/>
-    <p:sldLayoutId id="2147483737" r:id="rId8"/>
-    <p:sldLayoutId id="2147483738" r:id="rId9"/>
-    <p:sldLayoutId id="2147483739" r:id="rId10"/>
-    <p:sldLayoutId id="2147483740" r:id="rId11"/>
+    <p:sldLayoutId id="2147483790" r:id="rId1"/>
+    <p:sldLayoutId id="2147483791" r:id="rId2"/>
+    <p:sldLayoutId id="2147483792" r:id="rId3"/>
+    <p:sldLayoutId id="2147483793" r:id="rId4"/>
+    <p:sldLayoutId id="2147483794" r:id="rId5"/>
+    <p:sldLayoutId id="2147483795" r:id="rId6"/>
+    <p:sldLayoutId id="2147483796" r:id="rId7"/>
+    <p:sldLayoutId id="2147483797" r:id="rId8"/>
+    <p:sldLayoutId id="2147483798" r:id="rId9"/>
+    <p:sldLayoutId id="2147483799" r:id="rId10"/>
+    <p:sldLayoutId id="2147483800" r:id="rId11"/>
   </p:sldLayoutIdLst>
   <p:txStyles>
     <p:titleStyle>
@@ -4292,7 +4279,12 @@
             <p:ph type="ctrTitle"/>
           </p:nvPr>
         </p:nvSpPr>
-        <p:spPr/>
+        <p:spPr>
+          <a:xfrm>
+            <a:off x="1357054" y="1158126"/>
+            <a:ext cx="8574622" cy="2616199"/>
+          </a:xfrm>
+        </p:spPr>
         <p:txBody>
           <a:bodyPr>
             <a:normAutofit/>
@@ -4472,89 +4464,6 @@
           <p:cNvPr id="2" name="Title 1">
             <a:extLst>
               <a:ext uri="{FF2B5EF4-FFF2-40B4-BE49-F238E27FC236}">
-                <a16:creationId xmlns:a16="http://schemas.microsoft.com/office/drawing/2014/main" id="{B054E0AB-E791-441F-A4E4-2DBCCB409B57}"/>
-              </a:ext>
-            </a:extLst>
-          </p:cNvPr>
-          <p:cNvSpPr>
-            <a:spLocks noGrp="1"/>
-          </p:cNvSpPr>
-          <p:nvPr>
-            <p:ph type="title"/>
-          </p:nvPr>
-        </p:nvSpPr>
-        <p:spPr/>
-        <p:txBody>
-          <a:bodyPr/>
-          <a:lstStyle/>
-          <a:p>
-            <a:r>
-              <a:rPr lang="en-GB" dirty="0"/>
-              <a:t>Testing and validation</a:t>
-            </a:r>
-          </a:p>
-        </p:txBody>
-      </p:sp>
-      <p:sp>
-        <p:nvSpPr>
-          <p:cNvPr id="3" name="Content Placeholder 2">
-            <a:extLst>
-              <a:ext uri="{FF2B5EF4-FFF2-40B4-BE49-F238E27FC236}">
-                <a16:creationId xmlns:a16="http://schemas.microsoft.com/office/drawing/2014/main" id="{9317DFF7-96E0-4390-A1B6-C1A0B6F472E3}"/>
-              </a:ext>
-            </a:extLst>
-          </p:cNvPr>
-          <p:cNvSpPr>
-            <a:spLocks noGrp="1"/>
-          </p:cNvSpPr>
-          <p:nvPr>
-            <p:ph idx="1"/>
-          </p:nvPr>
-        </p:nvSpPr>
-        <p:spPr/>
-        <p:txBody>
-          <a:bodyPr/>
-          <a:lstStyle/>
-          <a:p>
-            <a:endParaRPr lang="en-GB" dirty="0"/>
-          </a:p>
-        </p:txBody>
-      </p:sp>
-    </p:spTree>
-    <p:extLst>
-      <p:ext uri="{BB962C8B-B14F-4D97-AF65-F5344CB8AC3E}">
-        <p14:creationId xmlns:p14="http://schemas.microsoft.com/office/powerpoint/2010/main" val="3534495692"/>
-      </p:ext>
-    </p:extLst>
-  </p:cSld>
-  <p:clrMapOvr>
-    <a:masterClrMapping/>
-  </p:clrMapOvr>
-</p:sld>
-</file>
-
-<file path=ppt/slides/slide11.xml><?xml version="1.0" encoding="utf-8"?>
-<p:sld xmlns:a="http://schemas.openxmlformats.org/drawingml/2006/main" xmlns:r="http://schemas.openxmlformats.org/officeDocument/2006/relationships" xmlns:p="http://schemas.openxmlformats.org/presentationml/2006/main">
-  <p:cSld>
-    <p:spTree>
-      <p:nvGrpSpPr>
-        <p:cNvPr id="1" name=""/>
-        <p:cNvGrpSpPr/>
-        <p:nvPr/>
-      </p:nvGrpSpPr>
-      <p:grpSpPr>
-        <a:xfrm>
-          <a:off x="0" y="0"/>
-          <a:ext cx="0" cy="0"/>
-          <a:chOff x="0" y="0"/>
-          <a:chExt cx="0" cy="0"/>
-        </a:xfrm>
-      </p:grpSpPr>
-      <p:sp>
-        <p:nvSpPr>
-          <p:cNvPr id="2" name="Title 1">
-            <a:extLst>
-              <a:ext uri="{FF2B5EF4-FFF2-40B4-BE49-F238E27FC236}">
                 <a16:creationId xmlns:a16="http://schemas.microsoft.com/office/drawing/2014/main" id="{81856E0F-6700-403C-AC07-E6225785A2E3}"/>
               </a:ext>
             </a:extLst>
@@ -4613,7 +4522,7 @@
           <a:p>
             <a:r>
               <a:rPr lang="en-GB" dirty="0"/>
-              <a:t>Mobile application</a:t>
+              <a:t>Make enclosure for sensitive part of the robot</a:t>
             </a:r>
           </a:p>
         </p:txBody>
@@ -4632,94 +4541,6 @@
 </file>
 
 <file path=ppt/slides/slide2.xml><?xml version="1.0" encoding="utf-8"?>
-<p:sld xmlns:a="http://schemas.openxmlformats.org/drawingml/2006/main" xmlns:r="http://schemas.openxmlformats.org/officeDocument/2006/relationships" xmlns:p="http://schemas.openxmlformats.org/presentationml/2006/main">
-  <p:cSld>
-    <p:spTree>
-      <p:nvGrpSpPr>
-        <p:cNvPr id="1" name=""/>
-        <p:cNvGrpSpPr/>
-        <p:nvPr/>
-      </p:nvGrpSpPr>
-      <p:grpSpPr>
-        <a:xfrm>
-          <a:off x="0" y="0"/>
-          <a:ext cx="0" cy="0"/>
-          <a:chOff x="0" y="0"/>
-          <a:chExt cx="0" cy="0"/>
-        </a:xfrm>
-      </p:grpSpPr>
-      <p:sp>
-        <p:nvSpPr>
-          <p:cNvPr id="2" name="Title 1">
-            <a:extLst>
-              <a:ext uri="{FF2B5EF4-FFF2-40B4-BE49-F238E27FC236}">
-                <a16:creationId xmlns:a16="http://schemas.microsoft.com/office/drawing/2014/main" id="{CD5E6405-363C-4095-997E-980A5019352D}"/>
-              </a:ext>
-            </a:extLst>
-          </p:cNvPr>
-          <p:cNvSpPr>
-            <a:spLocks noGrp="1"/>
-          </p:cNvSpPr>
-          <p:nvPr>
-            <p:ph type="title"/>
-          </p:nvPr>
-        </p:nvSpPr>
-        <p:spPr/>
-        <p:txBody>
-          <a:bodyPr/>
-          <a:lstStyle/>
-          <a:p>
-            <a:r>
-              <a:rPr lang="en-GB" dirty="0"/>
-              <a:t>Content</a:t>
-            </a:r>
-          </a:p>
-        </p:txBody>
-      </p:sp>
-      <p:sp>
-        <p:nvSpPr>
-          <p:cNvPr id="3" name="Content Placeholder 2">
-            <a:extLst>
-              <a:ext uri="{FF2B5EF4-FFF2-40B4-BE49-F238E27FC236}">
-                <a16:creationId xmlns:a16="http://schemas.microsoft.com/office/drawing/2014/main" id="{4745BC50-3743-4AE1-94A3-FEBE8A7F9584}"/>
-              </a:ext>
-            </a:extLst>
-          </p:cNvPr>
-          <p:cNvSpPr>
-            <a:spLocks noGrp="1"/>
-          </p:cNvSpPr>
-          <p:nvPr>
-            <p:ph idx="1"/>
-          </p:nvPr>
-        </p:nvSpPr>
-        <p:spPr/>
-        <p:txBody>
-          <a:bodyPr>
-            <a:normAutofit/>
-          </a:bodyPr>
-          <a:lstStyle/>
-          <a:p>
-            <a:pPr marL="0" indent="0">
-              <a:buNone/>
-            </a:pPr>
-            <a:endParaRPr lang="en-GB" dirty="0"/>
-          </a:p>
-        </p:txBody>
-      </p:sp>
-    </p:spTree>
-    <p:extLst>
-      <p:ext uri="{BB962C8B-B14F-4D97-AF65-F5344CB8AC3E}">
-        <p14:creationId xmlns:p14="http://schemas.microsoft.com/office/powerpoint/2010/main" val="91177884"/>
-      </p:ext>
-    </p:extLst>
-  </p:cSld>
-  <p:clrMapOvr>
-    <a:masterClrMapping/>
-  </p:clrMapOvr>
-</p:sld>
-</file>
-
-<file path=ppt/slides/slide3.xml><?xml version="1.0" encoding="utf-8"?>
 <p:sld xmlns:a="http://schemas.openxmlformats.org/drawingml/2006/main" xmlns:r="http://schemas.openxmlformats.org/officeDocument/2006/relationships" xmlns:p="http://schemas.openxmlformats.org/presentationml/2006/main">
   <p:cSld>
     <p:spTree>
@@ -4967,6 +4788,110 @@
 </p:sld>
 </file>
 
+<file path=ppt/slides/slide3.xml><?xml version="1.0" encoding="utf-8"?>
+<p:sld xmlns:a="http://schemas.openxmlformats.org/drawingml/2006/main" xmlns:r="http://schemas.openxmlformats.org/officeDocument/2006/relationships" xmlns:p="http://schemas.openxmlformats.org/presentationml/2006/main">
+  <p:cSld>
+    <p:spTree>
+      <p:nvGrpSpPr>
+        <p:cNvPr id="1" name=""/>
+        <p:cNvGrpSpPr/>
+        <p:nvPr/>
+      </p:nvGrpSpPr>
+      <p:grpSpPr>
+        <a:xfrm>
+          <a:off x="0" y="0"/>
+          <a:ext cx="0" cy="0"/>
+          <a:chOff x="0" y="0"/>
+          <a:chExt cx="0" cy="0"/>
+        </a:xfrm>
+      </p:grpSpPr>
+      <p:sp>
+        <p:nvSpPr>
+          <p:cNvPr id="2" name="Title 1">
+            <a:extLst>
+              <a:ext uri="{FF2B5EF4-FFF2-40B4-BE49-F238E27FC236}">
+                <a16:creationId xmlns:a16="http://schemas.microsoft.com/office/drawing/2014/main" id="{C618611C-FB07-42CF-BEFD-CFFB88F55CCA}"/>
+              </a:ext>
+            </a:extLst>
+          </p:cNvPr>
+          <p:cNvSpPr>
+            <a:spLocks noGrp="1"/>
+          </p:cNvSpPr>
+          <p:nvPr>
+            <p:ph type="title"/>
+          </p:nvPr>
+        </p:nvSpPr>
+        <p:spPr/>
+        <p:txBody>
+          <a:bodyPr/>
+          <a:lstStyle/>
+          <a:p>
+            <a:r>
+              <a:rPr lang="en-GB" dirty="0"/>
+              <a:t>Projects main goals</a:t>
+            </a:r>
+          </a:p>
+        </p:txBody>
+      </p:sp>
+      <p:sp>
+        <p:nvSpPr>
+          <p:cNvPr id="3" name="Content Placeholder 2">
+            <a:extLst>
+              <a:ext uri="{FF2B5EF4-FFF2-40B4-BE49-F238E27FC236}">
+                <a16:creationId xmlns:a16="http://schemas.microsoft.com/office/drawing/2014/main" id="{7D52293A-02AF-428D-BE7A-5CD083418682}"/>
+              </a:ext>
+            </a:extLst>
+          </p:cNvPr>
+          <p:cNvSpPr>
+            <a:spLocks noGrp="1"/>
+          </p:cNvSpPr>
+          <p:nvPr>
+            <p:ph idx="1"/>
+          </p:nvPr>
+        </p:nvSpPr>
+        <p:spPr/>
+        <p:txBody>
+          <a:bodyPr/>
+          <a:lstStyle/>
+          <a:p>
+            <a:r>
+              <a:rPr lang="en-GB" dirty="0"/>
+              <a:t>Building a mobile robot with Ros</a:t>
+            </a:r>
+          </a:p>
+          <a:p>
+            <a:r>
+              <a:rPr lang="en-GB" dirty="0"/>
+              <a:t>Making a user interface to allow understanding of the basic functions of the robot</a:t>
+            </a:r>
+          </a:p>
+          <a:p>
+            <a:r>
+              <a:rPr lang="en-GB" dirty="0"/>
+              <a:t>Interface mobile robot with a robot manipulator </a:t>
+            </a:r>
+          </a:p>
+          <a:p>
+            <a:pPr marL="0" indent="0">
+              <a:buNone/>
+            </a:pPr>
+            <a:endParaRPr lang="en-GB" dirty="0"/>
+          </a:p>
+        </p:txBody>
+      </p:sp>
+    </p:spTree>
+    <p:extLst>
+      <p:ext uri="{BB962C8B-B14F-4D97-AF65-F5344CB8AC3E}">
+        <p14:creationId xmlns:p14="http://schemas.microsoft.com/office/powerpoint/2010/main" val="1933071342"/>
+      </p:ext>
+    </p:extLst>
+  </p:cSld>
+  <p:clrMapOvr>
+    <a:masterClrMapping/>
+  </p:clrMapOvr>
+</p:sld>
+</file>
+
 <file path=ppt/slides/slide4.xml><?xml version="1.0" encoding="utf-8"?>
 <p:sld xmlns:a="http://schemas.openxmlformats.org/drawingml/2006/main" xmlns:r="http://schemas.openxmlformats.org/officeDocument/2006/relationships" xmlns:p="http://schemas.openxmlformats.org/presentationml/2006/main">
   <p:cSld>
@@ -4989,7 +4914,7 @@
           <p:cNvPr id="2" name="Title 1">
             <a:extLst>
               <a:ext uri="{FF2B5EF4-FFF2-40B4-BE49-F238E27FC236}">
-                <a16:creationId xmlns:a16="http://schemas.microsoft.com/office/drawing/2014/main" id="{C618611C-FB07-42CF-BEFD-CFFB88F55CCA}"/>
+                <a16:creationId xmlns:a16="http://schemas.microsoft.com/office/drawing/2014/main" id="{31389D03-90BF-438E-A6A2-D8598CB76442}"/>
               </a:ext>
             </a:extLst>
           </p:cNvPr>
@@ -5007,7 +4932,7 @@
           <a:p>
             <a:r>
               <a:rPr lang="en-GB" dirty="0"/>
-              <a:t>Projects main goals</a:t>
+              <a:t>State of the art</a:t>
             </a:r>
           </a:p>
         </p:txBody>
@@ -5017,7 +4942,7 @@
           <p:cNvPr id="3" name="Content Placeholder 2">
             <a:extLst>
               <a:ext uri="{FF2B5EF4-FFF2-40B4-BE49-F238E27FC236}">
-                <a16:creationId xmlns:a16="http://schemas.microsoft.com/office/drawing/2014/main" id="{7D52293A-02AF-428D-BE7A-5CD083418682}"/>
+                <a16:creationId xmlns:a16="http://schemas.microsoft.com/office/drawing/2014/main" id="{072269AB-B4F0-419B-AEF1-01E71DFB440E}"/>
               </a:ext>
             </a:extLst>
           </p:cNvPr>
@@ -5035,33 +4960,85 @@
           <a:p>
             <a:r>
               <a:rPr lang="en-GB" dirty="0"/>
-              <a:t>Building a mobile robot with Ros</a:t>
+              <a:t>What are mobile robots?</a:t>
             </a:r>
           </a:p>
           <a:p>
             <a:r>
               <a:rPr lang="en-GB" dirty="0"/>
-              <a:t>Making a user interface to allow understanding of the basic functions of the robot</a:t>
+              <a:t>About ROS</a:t>
             </a:r>
           </a:p>
           <a:p>
             <a:r>
               <a:rPr lang="en-GB" dirty="0"/>
-              <a:t>Interface mobile robot with a robot manipulator </a:t>
-            </a:r>
-          </a:p>
-          <a:p>
-            <a:pPr marL="0" indent="0">
-              <a:buNone/>
-            </a:pPr>
+              <a:t>Teaching Robotics</a:t>
+            </a:r>
+          </a:p>
+          <a:p>
             <a:endParaRPr lang="en-GB" dirty="0"/>
           </a:p>
-        </p:txBody>
-      </p:sp>
+          <a:p>
+            <a:endParaRPr lang="en-GB" dirty="0"/>
+          </a:p>
+        </p:txBody>
+      </p:sp>
+      <p:pic>
+        <p:nvPicPr>
+          <p:cNvPr id="2050" name="Picture 2" descr="Image result for robotic teaching">
+            <a:extLst>
+              <a:ext uri="{FF2B5EF4-FFF2-40B4-BE49-F238E27FC236}">
+                <a16:creationId xmlns:a16="http://schemas.microsoft.com/office/drawing/2014/main" id="{F1FC5025-9996-404B-A572-71461A5A4017}"/>
+              </a:ext>
+            </a:extLst>
+          </p:cNvPr>
+          <p:cNvPicPr>
+            <a:picLocks noChangeAspect="1" noChangeArrowheads="1"/>
+          </p:cNvPicPr>
+          <p:nvPr/>
+        </p:nvPicPr>
+        <p:blipFill>
+          <a:blip r:embed="rId3">
+            <a:extLst>
+              <a:ext uri="{28A0092B-C50C-407E-A947-70E740481C1C}">
+                <a14:useLocalDpi xmlns:a14="http://schemas.microsoft.com/office/drawing/2010/main" val="0"/>
+              </a:ext>
+            </a:extLst>
+          </a:blip>
+          <a:srcRect/>
+          <a:stretch>
+            <a:fillRect/>
+          </a:stretch>
+        </p:blipFill>
+        <p:spPr bwMode="auto">
+          <a:xfrm>
+            <a:off x="7089712" y="2013095"/>
+            <a:ext cx="4264088" cy="2984862"/>
+          </a:xfrm>
+          <a:prstGeom prst="rect">
+            <a:avLst/>
+          </a:prstGeom>
+          <a:ln>
+            <a:noFill/>
+          </a:ln>
+          <a:effectLst>
+            <a:softEdge rad="112500"/>
+          </a:effectLst>
+          <a:extLst>
+            <a:ext uri="{909E8E84-426E-40DD-AFC4-6F175D3DCCD1}">
+              <a14:hiddenFill xmlns:a14="http://schemas.microsoft.com/office/drawing/2010/main">
+                <a:solidFill>
+                  <a:srgbClr val="FFFFFF"/>
+                </a:solidFill>
+              </a14:hiddenFill>
+            </a:ext>
+          </a:extLst>
+        </p:spPr>
+      </p:pic>
     </p:spTree>
     <p:extLst>
       <p:ext uri="{BB962C8B-B14F-4D97-AF65-F5344CB8AC3E}">
-        <p14:creationId xmlns:p14="http://schemas.microsoft.com/office/powerpoint/2010/main" val="1933071342"/>
+        <p14:creationId xmlns:p14="http://schemas.microsoft.com/office/powerpoint/2010/main" val="861881270"/>
       </p:ext>
     </p:extLst>
   </p:cSld>
@@ -5093,7 +5070,7 @@
           <p:cNvPr id="2" name="Title 1">
             <a:extLst>
               <a:ext uri="{FF2B5EF4-FFF2-40B4-BE49-F238E27FC236}">
-                <a16:creationId xmlns:a16="http://schemas.microsoft.com/office/drawing/2014/main" id="{31389D03-90BF-438E-A6A2-D8598CB76442}"/>
+                <a16:creationId xmlns:a16="http://schemas.microsoft.com/office/drawing/2014/main" id="{E08041DE-1932-41FC-A6AD-6F97B2949786}"/>
               </a:ext>
             </a:extLst>
           </p:cNvPr>
@@ -5111,7 +5088,7 @@
           <a:p>
             <a:r>
               <a:rPr lang="en-GB" dirty="0"/>
-              <a:t>State of the art</a:t>
+              <a:t>Background information</a:t>
             </a:r>
           </a:p>
         </p:txBody>
@@ -5121,7 +5098,7 @@
           <p:cNvPr id="3" name="Content Placeholder 2">
             <a:extLst>
               <a:ext uri="{FF2B5EF4-FFF2-40B4-BE49-F238E27FC236}">
-                <a16:creationId xmlns:a16="http://schemas.microsoft.com/office/drawing/2014/main" id="{072269AB-B4F0-419B-AEF1-01E71DFB440E}"/>
+                <a16:creationId xmlns:a16="http://schemas.microsoft.com/office/drawing/2014/main" id="{83DF7990-E117-4A10-9FA1-A08488937DC8}"/>
               </a:ext>
             </a:extLst>
           </p:cNvPr>
@@ -5132,40 +5109,27 @@
             <p:ph idx="1"/>
           </p:nvPr>
         </p:nvSpPr>
-        <p:spPr/>
+        <p:spPr>
+          <a:xfrm>
+            <a:off x="838200" y="1866899"/>
+            <a:ext cx="10018713" cy="3124201"/>
+          </a:xfrm>
+        </p:spPr>
         <p:txBody>
           <a:bodyPr/>
           <a:lstStyle/>
           <a:p>
             <a:r>
               <a:rPr lang="en-GB" dirty="0"/>
-              <a:t>What are mobile robots?</a:t>
-            </a:r>
-          </a:p>
-          <a:p>
-            <a:r>
-              <a:rPr lang="en-GB" dirty="0"/>
-              <a:t>About ROS</a:t>
-            </a:r>
-          </a:p>
-          <a:p>
-            <a:r>
-              <a:rPr lang="en-GB" dirty="0"/>
-              <a:t>Teaching Robotics</a:t>
-            </a:r>
-          </a:p>
-          <a:p>
-            <a:endParaRPr lang="en-GB" dirty="0"/>
-          </a:p>
-          <a:p>
-            <a:endParaRPr lang="en-GB" dirty="0"/>
+              <a:t>Where did the project start form..?</a:t>
+            </a:r>
           </a:p>
         </p:txBody>
       </p:sp>
     </p:spTree>
     <p:extLst>
       <p:ext uri="{BB962C8B-B14F-4D97-AF65-F5344CB8AC3E}">
-        <p14:creationId xmlns:p14="http://schemas.microsoft.com/office/powerpoint/2010/main" val="861881270"/>
+        <p14:creationId xmlns:p14="http://schemas.microsoft.com/office/powerpoint/2010/main" val="685781578"/>
       </p:ext>
     </p:extLst>
   </p:cSld>
@@ -5178,6 +5142,14 @@
 <file path=ppt/slides/slide6.xml><?xml version="1.0" encoding="utf-8"?>
 <p:sld xmlns:a="http://schemas.openxmlformats.org/drawingml/2006/main" xmlns:r="http://schemas.openxmlformats.org/officeDocument/2006/relationships" xmlns:p="http://schemas.openxmlformats.org/presentationml/2006/main">
   <p:cSld>
+    <p:bg>
+      <p:bgPr>
+        <a:solidFill>
+          <a:schemeClr val="bg1"/>
+        </a:solidFill>
+        <a:effectLst/>
+      </p:bgPr>
+    </p:bg>
     <p:spTree>
       <p:nvGrpSpPr>
         <p:cNvPr id="1" name=""/>
@@ -5192,72 +5164,185 @@
           <a:chExt cx="0" cy="0"/>
         </a:xfrm>
       </p:grpSpPr>
-      <p:sp>
-        <p:nvSpPr>
-          <p:cNvPr id="2" name="Title 1">
-            <a:extLst>
-              <a:ext uri="{FF2B5EF4-FFF2-40B4-BE49-F238E27FC236}">
-                <a16:creationId xmlns:a16="http://schemas.microsoft.com/office/drawing/2014/main" id="{E08041DE-1932-41FC-A6AD-6F97B2949786}"/>
-              </a:ext>
-            </a:extLst>
-          </p:cNvPr>
-          <p:cNvSpPr>
-            <a:spLocks noGrp="1"/>
-          </p:cNvSpPr>
-          <p:nvPr>
-            <p:ph type="title"/>
-          </p:nvPr>
-        </p:nvSpPr>
-        <p:spPr/>
-        <p:txBody>
-          <a:bodyPr/>
-          <a:lstStyle/>
-          <a:p>
-            <a:r>
-              <a:rPr lang="en-GB" dirty="0"/>
-              <a:t>Background information</a:t>
-            </a:r>
-          </a:p>
-        </p:txBody>
-      </p:sp>
-      <p:sp>
-        <p:nvSpPr>
-          <p:cNvPr id="3" name="Content Placeholder 2">
-            <a:extLst>
-              <a:ext uri="{FF2B5EF4-FFF2-40B4-BE49-F238E27FC236}">
-                <a16:creationId xmlns:a16="http://schemas.microsoft.com/office/drawing/2014/main" id="{83DF7990-E117-4A10-9FA1-A08488937DC8}"/>
-              </a:ext>
-            </a:extLst>
-          </p:cNvPr>
-          <p:cNvSpPr>
-            <a:spLocks noGrp="1"/>
-          </p:cNvSpPr>
+      <p:pic>
+        <p:nvPicPr>
+          <p:cNvPr id="7" name="Picture 6">
+            <a:extLst>
+              <a:ext uri="{FF2B5EF4-FFF2-40B4-BE49-F238E27FC236}">
+                <a16:creationId xmlns:a16="http://schemas.microsoft.com/office/drawing/2014/main" id="{FD2840BE-4AC7-4B84-9282-EE6E354773E3}"/>
+              </a:ext>
+            </a:extLst>
+          </p:cNvPr>
+          <p:cNvPicPr>
+            <a:picLocks noChangeAspect="1"/>
+          </p:cNvPicPr>
+          <p:nvPr/>
+        </p:nvPicPr>
+        <p:blipFill>
+          <a:blip r:embed="rId2">
+            <a:extLst>
+              <a:ext uri="{28A0092B-C50C-407E-A947-70E740481C1C}">
+                <a14:useLocalDpi xmlns:a14="http://schemas.microsoft.com/office/drawing/2010/main" val="0"/>
+              </a:ext>
+            </a:extLst>
+          </a:blip>
+          <a:stretch>
+            <a:fillRect/>
+          </a:stretch>
+        </p:blipFill>
+        <p:spPr>
+          <a:xfrm>
+            <a:off x="1838440" y="0"/>
+            <a:ext cx="8209069" cy="6777549"/>
+          </a:xfrm>
+          <a:prstGeom prst="rect">
+            <a:avLst/>
+          </a:prstGeom>
+          <a:ln>
+            <a:noFill/>
+          </a:ln>
+          <a:effectLst>
+            <a:softEdge rad="112500"/>
+          </a:effectLst>
+        </p:spPr>
+      </p:pic>
+      <p:pic>
+        <p:nvPicPr>
+          <p:cNvPr id="11" name="Content Placeholder 10">
+            <a:extLst>
+              <a:ext uri="{FF2B5EF4-FFF2-40B4-BE49-F238E27FC236}">
+                <a16:creationId xmlns:a16="http://schemas.microsoft.com/office/drawing/2014/main" id="{6B6EF392-3318-4534-A078-2D746B82627E}"/>
+              </a:ext>
+            </a:extLst>
+          </p:cNvPr>
+          <p:cNvPicPr>
+            <a:picLocks noGrp="1" noChangeAspect="1"/>
+          </p:cNvPicPr>
           <p:nvPr>
             <p:ph idx="1"/>
           </p:nvPr>
-        </p:nvSpPr>
-        <p:spPr/>
-        <p:txBody>
-          <a:bodyPr/>
-          <a:lstStyle/>
-          <a:p>
-            <a:r>
-              <a:rPr lang="en-GB" dirty="0"/>
-              <a:t>Where did the project start form..?</a:t>
-            </a:r>
-          </a:p>
-        </p:txBody>
-      </p:sp>
+        </p:nvPicPr>
+        <p:blipFill>
+          <a:blip r:embed="rId3">
+            <a:extLst>
+              <a:ext uri="{28A0092B-C50C-407E-A947-70E740481C1C}">
+                <a14:useLocalDpi xmlns:a14="http://schemas.microsoft.com/office/drawing/2010/main" val="0"/>
+              </a:ext>
+            </a:extLst>
+          </a:blip>
+          <a:stretch>
+            <a:fillRect/>
+          </a:stretch>
+        </p:blipFill>
+        <p:spPr>
+          <a:xfrm>
+            <a:off x="1610514" y="-161795"/>
+            <a:ext cx="8970972" cy="7414544"/>
+          </a:xfrm>
+          <a:prstGeom prst="rect">
+            <a:avLst/>
+          </a:prstGeom>
+          <a:ln>
+            <a:noFill/>
+          </a:ln>
+          <a:effectLst>
+            <a:softEdge rad="112500"/>
+          </a:effectLst>
+        </p:spPr>
+      </p:pic>
     </p:spTree>
     <p:extLst>
       <p:ext uri="{BB962C8B-B14F-4D97-AF65-F5344CB8AC3E}">
-        <p14:creationId xmlns:p14="http://schemas.microsoft.com/office/powerpoint/2010/main" val="685781578"/>
+        <p14:creationId xmlns:p14="http://schemas.microsoft.com/office/powerpoint/2010/main" val="4062185196"/>
       </p:ext>
     </p:extLst>
   </p:cSld>
   <p:clrMapOvr>
     <a:masterClrMapping/>
   </p:clrMapOvr>
+  <p:timing>
+    <p:tnLst>
+      <p:par>
+        <p:cTn id="1" dur="indefinite" restart="never" nodeType="tmRoot">
+          <p:childTnLst>
+            <p:seq concurrent="1" nextAc="seek">
+              <p:cTn id="2" dur="indefinite" nodeType="mainSeq">
+                <p:childTnLst>
+                  <p:par>
+                    <p:cTn id="3" fill="hold">
+                      <p:stCondLst>
+                        <p:cond delay="indefinite"/>
+                      </p:stCondLst>
+                      <p:childTnLst>
+                        <p:par>
+                          <p:cTn id="4" fill="hold">
+                            <p:stCondLst>
+                              <p:cond delay="0"/>
+                            </p:stCondLst>
+                            <p:childTnLst>
+                              <p:par>
+                                <p:cTn id="5" presetID="10" presetClass="exit" presetSubtype="0" fill="hold" nodeType="clickEffect">
+                                  <p:stCondLst>
+                                    <p:cond delay="0"/>
+                                  </p:stCondLst>
+                                  <p:childTnLst>
+                                    <p:animEffect transition="out" filter="fade">
+                                      <p:cBhvr>
+                                        <p:cTn id="6" dur="500"/>
+                                        <p:tgtEl>
+                                          <p:spTgt spid="11"/>
+                                        </p:tgtEl>
+                                      </p:cBhvr>
+                                    </p:animEffect>
+                                    <p:set>
+                                      <p:cBhvr>
+                                        <p:cTn id="7" dur="1" fill="hold">
+                                          <p:stCondLst>
+                                            <p:cond delay="499"/>
+                                          </p:stCondLst>
+                                        </p:cTn>
+                                        <p:tgtEl>
+                                          <p:spTgt spid="11"/>
+                                        </p:tgtEl>
+                                        <p:attrNameLst>
+                                          <p:attrName>style.visibility</p:attrName>
+                                        </p:attrNameLst>
+                                      </p:cBhvr>
+                                      <p:to>
+                                        <p:strVal val="hidden"/>
+                                      </p:to>
+                                    </p:set>
+                                  </p:childTnLst>
+                                </p:cTn>
+                              </p:par>
+                            </p:childTnLst>
+                          </p:cTn>
+                        </p:par>
+                      </p:childTnLst>
+                    </p:cTn>
+                  </p:par>
+                </p:childTnLst>
+              </p:cTn>
+              <p:prevCondLst>
+                <p:cond evt="onPrev" delay="0">
+                  <p:tgtEl>
+                    <p:sldTgt/>
+                  </p:tgtEl>
+                </p:cond>
+              </p:prevCondLst>
+              <p:nextCondLst>
+                <p:cond evt="onNext" delay="0">
+                  <p:tgtEl>
+                    <p:sldTgt/>
+                  </p:tgtEl>
+                </p:cond>
+              </p:nextCondLst>
+            </p:seq>
+          </p:childTnLst>
+        </p:cTn>
+      </p:par>
+    </p:tnLst>
+  </p:timing>
 </p:sld>
 </file>
 
@@ -5278,56 +5363,90 @@
           <a:chExt cx="0" cy="0"/>
         </a:xfrm>
       </p:grpSpPr>
-      <p:sp>
-        <p:nvSpPr>
-          <p:cNvPr id="2" name="Title 1">
-            <a:extLst>
-              <a:ext uri="{FF2B5EF4-FFF2-40B4-BE49-F238E27FC236}">
-                <a16:creationId xmlns:a16="http://schemas.microsoft.com/office/drawing/2014/main" id="{AA562A12-564C-4011-AB82-D757C3B2201C}"/>
-              </a:ext>
-            </a:extLst>
-          </p:cNvPr>
-          <p:cNvSpPr>
-            <a:spLocks noGrp="1"/>
-          </p:cNvSpPr>
-          <p:nvPr>
-            <p:ph type="title"/>
-          </p:nvPr>
-        </p:nvSpPr>
-        <p:spPr/>
-        <p:txBody>
-          <a:bodyPr/>
-          <a:lstStyle/>
-          <a:p>
-            <a:endParaRPr lang="en-GB" dirty="0"/>
-          </a:p>
-        </p:txBody>
-      </p:sp>
-      <p:sp>
-        <p:nvSpPr>
-          <p:cNvPr id="3" name="Content Placeholder 2">
-            <a:extLst>
-              <a:ext uri="{FF2B5EF4-FFF2-40B4-BE49-F238E27FC236}">
-                <a16:creationId xmlns:a16="http://schemas.microsoft.com/office/drawing/2014/main" id="{756F54BD-EA79-4229-B17F-F703B686370D}"/>
-              </a:ext>
-            </a:extLst>
-          </p:cNvPr>
-          <p:cNvSpPr>
-            <a:spLocks noGrp="1"/>
-          </p:cNvSpPr>
-          <p:nvPr>
-            <p:ph idx="1"/>
-          </p:nvPr>
-        </p:nvSpPr>
-        <p:spPr/>
-        <p:txBody>
-          <a:bodyPr/>
-          <a:lstStyle/>
-          <a:p>
-            <a:endParaRPr lang="en-GB"/>
-          </a:p>
-        </p:txBody>
-      </p:sp>
+      <p:pic>
+        <p:nvPicPr>
+          <p:cNvPr id="7" name="Picture 6">
+            <a:extLst>
+              <a:ext uri="{FF2B5EF4-FFF2-40B4-BE49-F238E27FC236}">
+                <a16:creationId xmlns:a16="http://schemas.microsoft.com/office/drawing/2014/main" id="{B568D355-1EE1-439A-AE64-5DA4C9E4BC29}"/>
+              </a:ext>
+            </a:extLst>
+          </p:cNvPr>
+          <p:cNvPicPr>
+            <a:picLocks noChangeAspect="1"/>
+          </p:cNvPicPr>
+          <p:nvPr/>
+        </p:nvPicPr>
+        <p:blipFill>
+          <a:blip r:embed="rId3">
+            <a:extLst>
+              <a:ext uri="{28A0092B-C50C-407E-A947-70E740481C1C}">
+                <a14:useLocalDpi xmlns:a14="http://schemas.microsoft.com/office/drawing/2010/main" val="0"/>
+              </a:ext>
+            </a:extLst>
+          </a:blip>
+          <a:stretch>
+            <a:fillRect/>
+          </a:stretch>
+        </p:blipFill>
+        <p:spPr>
+          <a:xfrm>
+            <a:off x="2447416" y="47153"/>
+            <a:ext cx="7297168" cy="6763694"/>
+          </a:xfrm>
+          <a:prstGeom prst="rect">
+            <a:avLst/>
+          </a:prstGeom>
+          <a:ln>
+            <a:noFill/>
+          </a:ln>
+          <a:effectLst>
+            <a:softEdge rad="112500"/>
+          </a:effectLst>
+        </p:spPr>
+      </p:pic>
+      <p:pic>
+        <p:nvPicPr>
+          <p:cNvPr id="5" name="Picture 4">
+            <a:extLst>
+              <a:ext uri="{FF2B5EF4-FFF2-40B4-BE49-F238E27FC236}">
+                <a16:creationId xmlns:a16="http://schemas.microsoft.com/office/drawing/2014/main" id="{4238A265-89D4-42AA-ACB7-266A42F2F67B}"/>
+              </a:ext>
+            </a:extLst>
+          </p:cNvPr>
+          <p:cNvPicPr>
+            <a:picLocks noChangeAspect="1"/>
+          </p:cNvPicPr>
+          <p:nvPr/>
+        </p:nvPicPr>
+        <p:blipFill>
+          <a:blip r:embed="rId4">
+            <a:extLst>
+              <a:ext uri="{28A0092B-C50C-407E-A947-70E740481C1C}">
+                <a14:useLocalDpi xmlns:a14="http://schemas.microsoft.com/office/drawing/2010/main" val="0"/>
+              </a:ext>
+            </a:extLst>
+          </a:blip>
+          <a:stretch>
+            <a:fillRect/>
+          </a:stretch>
+        </p:blipFill>
+        <p:spPr>
+          <a:xfrm>
+            <a:off x="2336569" y="0"/>
+            <a:ext cx="7518862" cy="6858000"/>
+          </a:xfrm>
+          <a:prstGeom prst="rect">
+            <a:avLst/>
+          </a:prstGeom>
+          <a:ln>
+            <a:noFill/>
+          </a:ln>
+          <a:effectLst>
+            <a:softEdge rad="112500"/>
+          </a:effectLst>
+        </p:spPr>
+      </p:pic>
     </p:spTree>
     <p:extLst>
       <p:ext uri="{BB962C8B-B14F-4D97-AF65-F5344CB8AC3E}">
@@ -5338,6 +5457,89 @@
   <p:clrMapOvr>
     <a:masterClrMapping/>
   </p:clrMapOvr>
+  <p:timing>
+    <p:tnLst>
+      <p:par>
+        <p:cTn id="1" dur="indefinite" restart="never" nodeType="tmRoot">
+          <p:childTnLst>
+            <p:seq concurrent="1" nextAc="seek">
+              <p:cTn id="2" dur="indefinite" nodeType="mainSeq">
+                <p:childTnLst>
+                  <p:par>
+                    <p:cTn id="3" fill="hold">
+                      <p:stCondLst>
+                        <p:cond delay="indefinite"/>
+                      </p:stCondLst>
+                      <p:childTnLst>
+                        <p:par>
+                          <p:cTn id="4" fill="hold">
+                            <p:stCondLst>
+                              <p:cond delay="0"/>
+                            </p:stCondLst>
+                            <p:childTnLst>
+                              <p:par>
+                                <p:cTn id="5" presetID="10" presetClass="exit" presetSubtype="0" fill="hold" nodeType="clickEffect">
+                                  <p:stCondLst>
+                                    <p:cond delay="0"/>
+                                  </p:stCondLst>
+                                  <p:childTnLst>
+                                    <p:animEffect transition="out" filter="fade">
+                                      <p:cBhvr>
+                                        <p:cTn id="6" dur="500"/>
+                                        <p:tgtEl>
+                                          <p:spTgt spid="5"/>
+                                        </p:tgtEl>
+                                      </p:cBhvr>
+                                    </p:animEffect>
+                                    <p:set>
+                                      <p:cBhvr>
+                                        <p:cTn id="7" dur="1" fill="hold">
+                                          <p:stCondLst>
+                                            <p:cond delay="499"/>
+                                          </p:stCondLst>
+                                        </p:cTn>
+                                        <p:tgtEl>
+                                          <p:spTgt spid="5"/>
+                                        </p:tgtEl>
+                                        <p:attrNameLst>
+                                          <p:attrName>style.visibility</p:attrName>
+                                        </p:attrNameLst>
+                                      </p:cBhvr>
+                                      <p:to>
+                                        <p:strVal val="hidden"/>
+                                      </p:to>
+                                    </p:set>
+                                  </p:childTnLst>
+                                </p:cTn>
+                              </p:par>
+                            </p:childTnLst>
+                          </p:cTn>
+                        </p:par>
+                      </p:childTnLst>
+                    </p:cTn>
+                  </p:par>
+                </p:childTnLst>
+              </p:cTn>
+              <p:prevCondLst>
+                <p:cond evt="onPrev" delay="0">
+                  <p:tgtEl>
+                    <p:sldTgt/>
+                  </p:tgtEl>
+                </p:cond>
+              </p:prevCondLst>
+              <p:nextCondLst>
+                <p:cond evt="onNext" delay="0">
+                  <p:tgtEl>
+                    <p:sldTgt/>
+                  </p:tgtEl>
+                </p:cond>
+              </p:nextCondLst>
+            </p:seq>
+          </p:childTnLst>
+        </p:cTn>
+      </p:par>
+    </p:tnLst>
+  </p:timing>
 </p:sld>
 </file>
 
@@ -5363,7 +5565,7 @@
           <p:cNvPr id="2" name="Title 1">
             <a:extLst>
               <a:ext uri="{FF2B5EF4-FFF2-40B4-BE49-F238E27FC236}">
-                <a16:creationId xmlns:a16="http://schemas.microsoft.com/office/drawing/2014/main" id="{630E692D-234C-451F-80BB-C3AAE0B486B6}"/>
+                <a16:creationId xmlns:a16="http://schemas.microsoft.com/office/drawing/2014/main" id="{E2B648EE-AA67-4A4C-ACB2-04AD8702CBC6}"/>
               </a:ext>
             </a:extLst>
           </p:cNvPr>
@@ -5381,7 +5583,7 @@
           <a:p>
             <a:r>
               <a:rPr lang="en-GB" dirty="0"/>
-              <a:t>Current system</a:t>
+              <a:t>Project development</a:t>
             </a:r>
           </a:p>
         </p:txBody>
@@ -5391,7 +5593,7 @@
           <p:cNvPr id="3" name="Content Placeholder 2">
             <a:extLst>
               <a:ext uri="{FF2B5EF4-FFF2-40B4-BE49-F238E27FC236}">
-                <a16:creationId xmlns:a16="http://schemas.microsoft.com/office/drawing/2014/main" id="{7D748A31-206C-4CD3-9274-21FDE0F8617A}"/>
+                <a16:creationId xmlns:a16="http://schemas.microsoft.com/office/drawing/2014/main" id="{2DA64D06-7105-4774-9C5E-599FD29BE76C}"/>
               </a:ext>
             </a:extLst>
           </p:cNvPr>
@@ -5402,14 +5604,369 @@
             <p:ph idx="1"/>
           </p:nvPr>
         </p:nvSpPr>
-        <p:spPr/>
+        <p:spPr>
+          <a:xfrm>
+            <a:off x="838200" y="1816295"/>
+            <a:ext cx="10883167" cy="4165616"/>
+          </a:xfrm>
+        </p:spPr>
         <p:txBody>
           <a:bodyPr/>
           <a:lstStyle/>
           <a:p>
             <a:r>
               <a:rPr lang="en-GB" dirty="0"/>
-              <a:t>(put video of b4 and after design of the robot and if possible of the working webserver)</a:t>
+              <a:t>Design of mobile robot</a:t>
+            </a:r>
+          </a:p>
+          <a:p>
+            <a:r>
+              <a:rPr lang="en-GB" dirty="0"/>
+              <a:t>Design of manipulator</a:t>
+            </a:r>
+          </a:p>
+          <a:p>
+            <a:r>
+              <a:rPr lang="en-GB" dirty="0"/>
+              <a:t>3d printing</a:t>
+            </a:r>
+          </a:p>
+          <a:p>
+            <a:r>
+              <a:rPr lang="en-GB" dirty="0"/>
+              <a:t>Laser cutting</a:t>
+            </a:r>
+          </a:p>
+          <a:p>
+            <a:r>
+              <a:rPr lang="en-GB" dirty="0"/>
+              <a:t>Review</a:t>
+            </a:r>
+          </a:p>
+          <a:p>
+            <a:r>
+              <a:rPr lang="en-GB" dirty="0"/>
+              <a:t>Repeat</a:t>
+            </a:r>
+          </a:p>
+        </p:txBody>
+      </p:sp>
+      <p:pic>
+        <p:nvPicPr>
+          <p:cNvPr id="1030" name="Picture 6" descr="Image result for project development life cycle">
+            <a:extLst>
+              <a:ext uri="{FF2B5EF4-FFF2-40B4-BE49-F238E27FC236}">
+                <a16:creationId xmlns:a16="http://schemas.microsoft.com/office/drawing/2014/main" id="{8AE1C97A-A86D-46DA-9562-A2100A928742}"/>
+              </a:ext>
+            </a:extLst>
+          </p:cNvPr>
+          <p:cNvPicPr>
+            <a:picLocks noChangeAspect="1" noChangeArrowheads="1"/>
+          </p:cNvPicPr>
+          <p:nvPr/>
+        </p:nvPicPr>
+        <p:blipFill>
+          <a:blip r:embed="rId3">
+            <a:extLst>
+              <a:ext uri="{28A0092B-C50C-407E-A947-70E740481C1C}">
+                <a14:useLocalDpi xmlns:a14="http://schemas.microsoft.com/office/drawing/2010/main" val="0"/>
+              </a:ext>
+            </a:extLst>
+          </a:blip>
+          <a:srcRect/>
+          <a:stretch>
+            <a:fillRect/>
+          </a:stretch>
+        </p:blipFill>
+        <p:spPr bwMode="auto">
+          <a:xfrm>
+            <a:off x="7022235" y="1633360"/>
+            <a:ext cx="3634289" cy="3591280"/>
+          </a:xfrm>
+          <a:prstGeom prst="rect">
+            <a:avLst/>
+          </a:prstGeom>
+          <a:noFill/>
+          <a:extLst>
+            <a:ext uri="{909E8E84-426E-40DD-AFC4-6F175D3DCCD1}">
+              <a14:hiddenFill xmlns:a14="http://schemas.microsoft.com/office/drawing/2010/main">
+                <a:solidFill>
+                  <a:srgbClr val="FFFFFF"/>
+                </a:solidFill>
+              </a14:hiddenFill>
+            </a:ext>
+          </a:extLst>
+        </p:spPr>
+      </p:pic>
+      <p:pic>
+        <p:nvPicPr>
+          <p:cNvPr id="1026" name="Picture 2" descr="Image result for solidworks icon">
+            <a:extLst>
+              <a:ext uri="{FF2B5EF4-FFF2-40B4-BE49-F238E27FC236}">
+                <a16:creationId xmlns:a16="http://schemas.microsoft.com/office/drawing/2014/main" id="{7A294B4D-179C-4F2A-93E7-20AB1C478AD6}"/>
+              </a:ext>
+            </a:extLst>
+          </p:cNvPr>
+          <p:cNvPicPr>
+            <a:picLocks noChangeAspect="1" noChangeArrowheads="1"/>
+          </p:cNvPicPr>
+          <p:nvPr/>
+        </p:nvPicPr>
+        <p:blipFill>
+          <a:blip r:embed="rId4">
+            <a:extLst>
+              <a:ext uri="{28A0092B-C50C-407E-A947-70E740481C1C}">
+                <a14:useLocalDpi xmlns:a14="http://schemas.microsoft.com/office/drawing/2010/main" val="0"/>
+              </a:ext>
+            </a:extLst>
+          </a:blip>
+          <a:srcRect/>
+          <a:stretch>
+            <a:fillRect/>
+          </a:stretch>
+        </p:blipFill>
+        <p:spPr bwMode="auto">
+          <a:xfrm>
+            <a:off x="10470327" y="2318250"/>
+            <a:ext cx="718618" cy="609406"/>
+          </a:xfrm>
+          <a:prstGeom prst="rect">
+            <a:avLst/>
+          </a:prstGeom>
+          <a:noFill/>
+          <a:extLst>
+            <a:ext uri="{909E8E84-426E-40DD-AFC4-6F175D3DCCD1}">
+              <a14:hiddenFill xmlns:a14="http://schemas.microsoft.com/office/drawing/2010/main">
+                <a:solidFill>
+                  <a:srgbClr val="FFFFFF"/>
+                </a:solidFill>
+              </a14:hiddenFill>
+            </a:ext>
+          </a:extLst>
+        </p:spPr>
+      </p:pic>
+      <p:pic>
+        <p:nvPicPr>
+          <p:cNvPr id="6" name="Picture 5">
+            <a:extLst>
+              <a:ext uri="{FF2B5EF4-FFF2-40B4-BE49-F238E27FC236}">
+                <a16:creationId xmlns:a16="http://schemas.microsoft.com/office/drawing/2014/main" id="{B5F4E10D-D787-4503-8A73-7BB31B65D305}"/>
+              </a:ext>
+            </a:extLst>
+          </p:cNvPr>
+          <p:cNvPicPr>
+            <a:picLocks noChangeAspect="1"/>
+          </p:cNvPicPr>
+          <p:nvPr/>
+        </p:nvPicPr>
+        <p:blipFill>
+          <a:blip r:embed="rId5">
+            <a:extLst>
+              <a:ext uri="{28A0092B-C50C-407E-A947-70E740481C1C}">
+                <a14:useLocalDpi xmlns:a14="http://schemas.microsoft.com/office/drawing/2010/main" val="0"/>
+              </a:ext>
+              <a:ext uri="{837473B0-CC2E-450A-ABE3-18F120FF3D39}">
+                <a1611:picAttrSrcUrl xmlns:a1611="http://schemas.microsoft.com/office/drawing/2016/11/main" r:id="rId6"/>
+              </a:ext>
+            </a:extLst>
+          </a:blip>
+          <a:stretch>
+            <a:fillRect/>
+          </a:stretch>
+        </p:blipFill>
+        <p:spPr>
+          <a:xfrm>
+            <a:off x="10749265" y="2954898"/>
+            <a:ext cx="862782" cy="463111"/>
+          </a:xfrm>
+          <a:prstGeom prst="rect">
+            <a:avLst/>
+          </a:prstGeom>
+        </p:spPr>
+      </p:pic>
+      <p:pic>
+        <p:nvPicPr>
+          <p:cNvPr id="1028" name="Picture 4" descr="Image result for ubuntu mate icon">
+            <a:extLst>
+              <a:ext uri="{FF2B5EF4-FFF2-40B4-BE49-F238E27FC236}">
+                <a16:creationId xmlns:a16="http://schemas.microsoft.com/office/drawing/2014/main" id="{B430952D-5BE1-443C-AB58-BF2616FB0B9E}"/>
+              </a:ext>
+            </a:extLst>
+          </p:cNvPr>
+          <p:cNvPicPr>
+            <a:picLocks noChangeAspect="1" noChangeArrowheads="1"/>
+          </p:cNvPicPr>
+          <p:nvPr/>
+        </p:nvPicPr>
+        <p:blipFill>
+          <a:blip r:embed="rId7">
+            <a:extLst>
+              <a:ext uri="{28A0092B-C50C-407E-A947-70E740481C1C}">
+                <a14:useLocalDpi xmlns:a14="http://schemas.microsoft.com/office/drawing/2010/main" val="0"/>
+              </a:ext>
+            </a:extLst>
+          </a:blip>
+          <a:srcRect/>
+          <a:stretch>
+            <a:fillRect/>
+          </a:stretch>
+        </p:blipFill>
+        <p:spPr bwMode="auto">
+          <a:xfrm>
+            <a:off x="10718376" y="3265408"/>
+            <a:ext cx="924559" cy="876090"/>
+          </a:xfrm>
+          <a:prstGeom prst="rect">
+            <a:avLst/>
+          </a:prstGeom>
+          <a:noFill/>
+          <a:extLst>
+            <a:ext uri="{909E8E84-426E-40DD-AFC4-6F175D3DCCD1}">
+              <a14:hiddenFill xmlns:a14="http://schemas.microsoft.com/office/drawing/2010/main">
+                <a:solidFill>
+                  <a:srgbClr val="FFFFFF"/>
+                </a:solidFill>
+              </a14:hiddenFill>
+            </a:ext>
+          </a:extLst>
+        </p:spPr>
+      </p:pic>
+      <p:sp>
+        <p:nvSpPr>
+          <p:cNvPr id="4" name="TextBox 3">
+            <a:extLst>
+              <a:ext uri="{FF2B5EF4-FFF2-40B4-BE49-F238E27FC236}">
+                <a16:creationId xmlns:a16="http://schemas.microsoft.com/office/drawing/2014/main" id="{46E18CCC-EFA7-457C-A703-519A99B6CA55}"/>
+              </a:ext>
+            </a:extLst>
+          </p:cNvPr>
+          <p:cNvSpPr txBox="1"/>
+          <p:nvPr/>
+        </p:nvSpPr>
+        <p:spPr>
+          <a:xfrm>
+            <a:off x="9311951" y="1548882"/>
+            <a:ext cx="1420069" cy="369332"/>
+          </a:xfrm>
+          <a:prstGeom prst="rect">
+            <a:avLst/>
+          </a:prstGeom>
+          <a:noFill/>
+        </p:spPr>
+        <p:txBody>
+          <a:bodyPr wrap="none" rtlCol="0">
+            <a:spAutoFit/>
+          </a:bodyPr>
+          <a:lstStyle/>
+          <a:p>
+            <a:r>
+              <a:rPr lang="en-GB" dirty="0"/>
+              <a:t>Project Goals</a:t>
+            </a:r>
+          </a:p>
+        </p:txBody>
+      </p:sp>
+      <p:sp>
+        <p:nvSpPr>
+          <p:cNvPr id="5" name="TextBox 4">
+            <a:extLst>
+              <a:ext uri="{FF2B5EF4-FFF2-40B4-BE49-F238E27FC236}">
+                <a16:creationId xmlns:a16="http://schemas.microsoft.com/office/drawing/2014/main" id="{B39844EE-1BBB-4F46-B453-703EA338E0D5}"/>
+              </a:ext>
+            </a:extLst>
+          </p:cNvPr>
+          <p:cNvSpPr txBox="1"/>
+          <p:nvPr/>
+        </p:nvSpPr>
+        <p:spPr>
+          <a:xfrm>
+            <a:off x="10087302" y="4632537"/>
+            <a:ext cx="2041393" cy="369332"/>
+          </a:xfrm>
+          <a:prstGeom prst="rect">
+            <a:avLst/>
+          </a:prstGeom>
+          <a:noFill/>
+        </p:spPr>
+        <p:txBody>
+          <a:bodyPr wrap="none" rtlCol="0">
+            <a:spAutoFit/>
+          </a:bodyPr>
+          <a:lstStyle/>
+          <a:p>
+            <a:r>
+              <a:rPr lang="en-GB" dirty="0"/>
+              <a:t>Testing &amp; Validation</a:t>
+            </a:r>
+          </a:p>
+        </p:txBody>
+      </p:sp>
+      <p:sp>
+        <p:nvSpPr>
+          <p:cNvPr id="7" name="TextBox 6">
+            <a:extLst>
+              <a:ext uri="{FF2B5EF4-FFF2-40B4-BE49-F238E27FC236}">
+                <a16:creationId xmlns:a16="http://schemas.microsoft.com/office/drawing/2014/main" id="{5D0E8754-0D18-4A7E-930F-EB4499E507A9}"/>
+              </a:ext>
+            </a:extLst>
+          </p:cNvPr>
+          <p:cNvSpPr txBox="1"/>
+          <p:nvPr/>
+        </p:nvSpPr>
+        <p:spPr>
+          <a:xfrm>
+            <a:off x="5507231" y="3623785"/>
+            <a:ext cx="1602811" cy="369332"/>
+          </a:xfrm>
+          <a:prstGeom prst="rect">
+            <a:avLst/>
+          </a:prstGeom>
+          <a:noFill/>
+        </p:spPr>
+        <p:txBody>
+          <a:bodyPr wrap="none" rtlCol="0">
+            <a:spAutoFit/>
+          </a:bodyPr>
+          <a:lstStyle/>
+          <a:p>
+            <a:r>
+              <a:rPr lang="en-GB" dirty="0"/>
+              <a:t>Battery life etc.</a:t>
+            </a:r>
+          </a:p>
+        </p:txBody>
+      </p:sp>
+      <p:sp>
+        <p:nvSpPr>
+          <p:cNvPr id="8" name="TextBox 7">
+            <a:extLst>
+              <a:ext uri="{FF2B5EF4-FFF2-40B4-BE49-F238E27FC236}">
+                <a16:creationId xmlns:a16="http://schemas.microsoft.com/office/drawing/2014/main" id="{30004EAD-489A-486A-AE6E-20F1A11E266F}"/>
+              </a:ext>
+            </a:extLst>
+          </p:cNvPr>
+          <p:cNvSpPr txBox="1"/>
+          <p:nvPr/>
+        </p:nvSpPr>
+        <p:spPr>
+          <a:xfrm>
+            <a:off x="6929494" y="5124452"/>
+            <a:ext cx="1778372" cy="369332"/>
+          </a:xfrm>
+          <a:prstGeom prst="rect">
+            <a:avLst/>
+          </a:prstGeom>
+          <a:noFill/>
+        </p:spPr>
+        <p:txBody>
+          <a:bodyPr wrap="none" rtlCol="0">
+            <a:spAutoFit/>
+          </a:bodyPr>
+          <a:lstStyle/>
+          <a:p>
+            <a:r>
+              <a:rPr lang="en-GB" dirty="0"/>
+              <a:t>G.A’s &amp; Lecturers</a:t>
             </a:r>
           </a:p>
         </p:txBody>
@@ -5417,7 +5974,7 @@
     </p:spTree>
     <p:extLst>
       <p:ext uri="{BB962C8B-B14F-4D97-AF65-F5344CB8AC3E}">
-        <p14:creationId xmlns:p14="http://schemas.microsoft.com/office/powerpoint/2010/main" val="875279363"/>
+        <p14:creationId xmlns:p14="http://schemas.microsoft.com/office/powerpoint/2010/main" val="35480381"/>
       </p:ext>
     </p:extLst>
   </p:cSld>
@@ -5449,7 +6006,7 @@
           <p:cNvPr id="2" name="Title 1">
             <a:extLst>
               <a:ext uri="{FF2B5EF4-FFF2-40B4-BE49-F238E27FC236}">
-                <a16:creationId xmlns:a16="http://schemas.microsoft.com/office/drawing/2014/main" id="{E2B648EE-AA67-4A4C-ACB2-04AD8702CBC6}"/>
+                <a16:creationId xmlns:a16="http://schemas.microsoft.com/office/drawing/2014/main" id="{B054E0AB-E791-441F-A4E4-2DBCCB409B57}"/>
               </a:ext>
             </a:extLst>
           </p:cNvPr>
@@ -5467,7 +6024,7 @@
           <a:p>
             <a:r>
               <a:rPr lang="en-GB" dirty="0"/>
-              <a:t>Project development</a:t>
+              <a:t>Testing and validation</a:t>
             </a:r>
           </a:p>
         </p:txBody>
@@ -5477,7 +6034,7 @@
           <p:cNvPr id="3" name="Content Placeholder 2">
             <a:extLst>
               <a:ext uri="{FF2B5EF4-FFF2-40B4-BE49-F238E27FC236}">
-                <a16:creationId xmlns:a16="http://schemas.microsoft.com/office/drawing/2014/main" id="{2DA64D06-7105-4774-9C5E-599FD29BE76C}"/>
+                <a16:creationId xmlns:a16="http://schemas.microsoft.com/office/drawing/2014/main" id="{9317DFF7-96E0-4390-A1B6-C1A0B6F472E3}"/>
               </a:ext>
             </a:extLst>
           </p:cNvPr>
@@ -5493,82 +6050,14 @@
           <a:bodyPr/>
           <a:lstStyle/>
           <a:p>
-            <a:r>
-              <a:rPr lang="en-GB" dirty="0"/>
-              <a:t>Design of mobile robot</a:t>
-            </a:r>
-          </a:p>
-          <a:p>
-            <a:r>
-              <a:rPr lang="en-GB" dirty="0"/>
-              <a:t>Design of manipulator</a:t>
-            </a:r>
-          </a:p>
-          <a:p>
-            <a:r>
-              <a:rPr lang="en-GB" dirty="0"/>
-              <a:t>3d printing</a:t>
-            </a:r>
-          </a:p>
-          <a:p>
-            <a:r>
-              <a:rPr lang="en-GB" dirty="0"/>
-              <a:t>Laser cutting</a:t>
-            </a:r>
-          </a:p>
-        </p:txBody>
-      </p:sp>
-      <p:pic>
-        <p:nvPicPr>
-          <p:cNvPr id="1030" name="Picture 6" descr="Image result for project development life cycle">
-            <a:extLst>
-              <a:ext uri="{FF2B5EF4-FFF2-40B4-BE49-F238E27FC236}">
-                <a16:creationId xmlns:a16="http://schemas.microsoft.com/office/drawing/2014/main" id="{8AE1C97A-A86D-46DA-9562-A2100A928742}"/>
-              </a:ext>
-            </a:extLst>
-          </p:cNvPr>
-          <p:cNvPicPr>
-            <a:picLocks noChangeAspect="1" noChangeArrowheads="1"/>
-          </p:cNvPicPr>
-          <p:nvPr/>
-        </p:nvPicPr>
-        <p:blipFill>
-          <a:blip r:embed="rId2">
-            <a:extLst>
-              <a:ext uri="{28A0092B-C50C-407E-A947-70E740481C1C}">
-                <a14:useLocalDpi xmlns:a14="http://schemas.microsoft.com/office/drawing/2010/main" val="0"/>
-              </a:ext>
-            </a:extLst>
-          </a:blip>
-          <a:srcRect/>
-          <a:stretch>
-            <a:fillRect/>
-          </a:stretch>
-        </p:blipFill>
-        <p:spPr bwMode="auto">
-          <a:xfrm>
-            <a:off x="6940062" y="1463187"/>
-            <a:ext cx="4071570" cy="4023386"/>
-          </a:xfrm>
-          <a:prstGeom prst="rect">
-            <a:avLst/>
-          </a:prstGeom>
-          <a:noFill/>
-          <a:extLst>
-            <a:ext uri="{909E8E84-426E-40DD-AFC4-6F175D3DCCD1}">
-              <a14:hiddenFill xmlns:a14="http://schemas.microsoft.com/office/drawing/2010/main">
-                <a:solidFill>
-                  <a:srgbClr val="FFFFFF"/>
-                </a:solidFill>
-              </a14:hiddenFill>
-            </a:ext>
-          </a:extLst>
-        </p:spPr>
-      </p:pic>
+            <a:endParaRPr lang="en-GB" dirty="0"/>
+          </a:p>
+        </p:txBody>
+      </p:sp>
     </p:spTree>
     <p:extLst>
       <p:ext uri="{BB962C8B-B14F-4D97-AF65-F5344CB8AC3E}">
-        <p14:creationId xmlns:p14="http://schemas.microsoft.com/office/powerpoint/2010/main" val="35480381"/>
+        <p14:creationId xmlns:p14="http://schemas.microsoft.com/office/powerpoint/2010/main" val="3534495692"/>
       </p:ext>
     </p:extLst>
   </p:cSld>

</xml_diff>